<commit_message>
Enhance CIMC proposal slides with styling, charts, and improved content generation
Co-authored-by: csmangum <csmangum@gmail.com>
</commit_message>
<xml_diff>
--- a/CIMC_Proposal_Presentation.pptx
+++ b/CIMC_Proposal_Presentation.pptx
@@ -121,6 +121,110 @@
 </p:presentation>
 </file>
 
+<file path=ppt/charts/chart1.xml><?xml version="1.0" encoding="utf-8"?>
+<c:chartSpace xmlns:c="http://schemas.openxmlformats.org/drawingml/2006/chart" xmlns:a="http://schemas.openxmlformats.org/drawingml/2006/main" xmlns:r="http://schemas.openxmlformats.org/officeDocument/2006/relationships">
+  <c:chart>
+    <c:autoTitleDeleted val="0"/>
+    <c:plotArea>
+      <c:pieChart>
+        <c:varyColors val="1"/>
+        <c:ser>
+          <c:idx val="0"/>
+          <c:order val="0"/>
+          <c:tx>
+            <c:strRef>
+              <c:f>Sheet1!$B$1</c:f>
+              <c:strCache>
+                <c:ptCount val="1"/>
+                <c:pt idx="0">
+                  <c:v>Budget ($56,300)</c:v>
+                </c:pt>
+              </c:strCache>
+            </c:strRef>
+          </c:tx>
+          <c:cat>
+            <c:strRef>
+              <c:f>Sheet1!$A$2:$A$6</c:f>
+              <c:strCache>
+                <c:ptCount val="5"/>
+                <c:pt idx="0">
+                  <c:v>Research Stipend</c:v>
+                </c:pt>
+                <c:pt idx="1">
+                  <c:v>Compute</c:v>
+                </c:pt>
+                <c:pt idx="2">
+                  <c:v>Software &amp; Tools</c:v>
+                </c:pt>
+                <c:pt idx="3">
+                  <c:v>Dissemination</c:v>
+                </c:pt>
+                <c:pt idx="4">
+                  <c:v>Contingency</c:v>
+                </c:pt>
+              </c:strCache>
+            </c:strRef>
+          </c:cat>
+          <c:val>
+            <c:numRef>
+              <c:f>Sheet1!$B$2:$B$6</c:f>
+              <c:numCache>
+                <c:formatCode>General</c:formatCode>
+                <c:ptCount val="5"/>
+                <c:pt idx="0">
+                  <c:v>30000</c:v>
+                </c:pt>
+                <c:pt idx="1">
+                  <c:v>17500</c:v>
+                </c:pt>
+                <c:pt idx="2">
+                  <c:v>5300</c:v>
+                </c:pt>
+                <c:pt idx="3">
+                  <c:v>2500</c:v>
+                </c:pt>
+                <c:pt idx="4">
+                  <c:v>1000</c:v>
+                </c:pt>
+              </c:numCache>
+            </c:numRef>
+          </c:val>
+        </c:ser>
+        <c:dLbls>
+          <c:numFmt formatCode="$#,##0" sourceLinked="0"/>
+          <c:dLblPos val="bestFit"/>
+          <c:showLegendKey val="0"/>
+          <c:showVal val="1"/>
+          <c:showCatName val="0"/>
+          <c:showSerName val="0"/>
+          <c:showPercent val="0"/>
+          <c:showBubbleSize val="0"/>
+          <c:showLeaderLines val="1"/>
+        </c:dLbls>
+      </c:pieChart>
+    </c:plotArea>
+    <c:legend>
+      <c:legendPos/>
+      <c:overlay val="0"/>
+    </c:legend>
+    <c:dispBlanksAs val="gap"/>
+  </c:chart>
+  <c:txPr>
+    <a:bodyPr/>
+    <a:lstStyle/>
+    <a:p>
+      <a:pPr>
+        <a:defRPr sz="1800"/>
+      </a:pPr>
+      <a:endParaRPr lang="en-US"/>
+    </a:p>
+  </c:txPr>
+  <c:externalData r:id="rId1">
+    <c:autoUpdate val="0"/>
+  </c:externalData>
+</c:chartSpace>
+</file>
+
 <file path=ppt/notesMasters/notesMaster1.xml><?xml version="1.0" encoding="utf-8"?>
 <p:notesMaster xmlns:a="http://schemas.openxmlformats.org/drawingml/2006/main" xmlns:p="http://schemas.openxmlformats.org/presentationml/2006/main" xmlns:r="http://schemas.openxmlformats.org/officeDocument/2006/relationships">
   <p:cSld>
@@ -1156,7 +1260,7 @@
           <a:lstStyle/>
           <a:p>
             <a:r>
-              <a:t>Reference comparison: PlaNet, recurrent world models.</a:t>
+              <a:t>Comparison: PlaNet, recurrent world models.</a:t>
             </a:r>
           </a:p>
           <a:p>
@@ -1231,7 +1335,7 @@
           <a:lstStyle/>
           <a:p>
             <a:r>
-              <a:t>Show system block diagram: sensors → encoders → HVAE → counterfactuals → decoder.</a:t>
+              <a:t>Show system diagram: sensors → encoders → HVAE → counterfactuals → decoder.</a:t>
             </a:r>
           </a:p>
         </p:txBody>
@@ -4532,7 +4636,14 @@
           <a:bodyPr/>
           <a:lstStyle/>
           <a:p>
-            <a:r>
+            <a:pPr algn="l"/>
+            <a:r>
+              <a:rPr sz="4000" b="1">
+                <a:solidFill>
+                  <a:srgbClr val="225588"/>
+                </a:solidFill>
+                <a:latin typeface="Calibri Light"/>
+              </a:rPr>
               <a:t>Latent Experience Modeling for Counterfactual Reasoning in Agents</a:t>
             </a:r>
           </a:p>
@@ -4550,10 +4661,13 @@
         </p:nvSpPr>
         <p:spPr/>
         <p:txBody>
-          <a:bodyPr/>
-          <a:lstStyle/>
-          <a:p>
-            <a:r>
+          <a:bodyPr lIns="0" rIns="0"/>
+          <a:lstStyle/>
+          <a:p>
+            <a:r>
+              <a:rPr sz="2000">
+                <a:latin typeface="Calibri"/>
+              </a:rPr>
               <a:t>Presenter: Chris Mangum | CIMC Research Proposal</a:t>
             </a:r>
           </a:p>
@@ -4592,7 +4706,14 @@
           <a:bodyPr/>
           <a:lstStyle/>
           <a:p>
-            <a:r>
+            <a:pPr algn="l"/>
+            <a:r>
+              <a:rPr sz="4000" b="1">
+                <a:solidFill>
+                  <a:srgbClr val="225588"/>
+                </a:solidFill>
+                <a:latin typeface="Calibri Light"/>
+              </a:rPr>
               <a:t>Implementation Plan &amp; Timeline (40 Weeks)</a:t>
             </a:r>
           </a:p>
@@ -4610,29 +4731,32 @@
         </p:nvSpPr>
         <p:spPr/>
         <p:txBody>
-          <a:bodyPr/>
-          <a:lstStyle/>
-          <a:p>
-            <a:pPr>
-              <a:defRPr sz="2000"/>
-            </a:pPr>
-            <a:r>
+          <a:bodyPr lIns="0" rIns="0"/>
+          <a:lstStyle/>
+          <a:p>
+            <a:pPr/>
+            <a:r>
+              <a:rPr sz="2000">
+                <a:latin typeface="Calibri"/>
+              </a:rPr>
               <a:t>Phases: Foundations; Core; Temporal+Hierarchy; Eval; Demo</a:t>
             </a:r>
           </a:p>
           <a:p>
-            <a:pPr>
-              <a:defRPr sz="2000"/>
-            </a:pPr>
-            <a:r>
+            <a:pPr/>
+            <a:r>
+              <a:rPr sz="2000">
+                <a:latin typeface="Calibri"/>
+              </a:rPr>
               <a:t>Tools: PyTorch, Optuna, W&amp;B; UMAP/t-SNE</a:t>
             </a:r>
           </a:p>
           <a:p>
-            <a:pPr>
-              <a:defRPr sz="2000"/>
-            </a:pPr>
-            <a:r>
+            <a:pPr/>
+            <a:r>
+              <a:rPr sz="2000">
+                <a:latin typeface="Calibri"/>
+              </a:rPr>
               <a:t>Environment: custom 2D gridworld (AgentFarm-compatible)</a:t>
             </a:r>
           </a:p>
@@ -4671,7 +4795,14 @@
           <a:bodyPr/>
           <a:lstStyle/>
           <a:p>
-            <a:r>
+            <a:pPr algn="l"/>
+            <a:r>
+              <a:rPr sz="4000" b="1">
+                <a:solidFill>
+                  <a:srgbClr val="225588"/>
+                </a:solidFill>
+                <a:latin typeface="Calibri Light"/>
+              </a:rPr>
               <a:t>Deliverables, Impact, and Demo</a:t>
             </a:r>
           </a:p>
@@ -4689,30 +4820,81 @@
         </p:nvSpPr>
         <p:spPr/>
         <p:txBody>
-          <a:bodyPr/>
+          <a:bodyPr lIns="0" rIns="0"/>
+          <a:lstStyle/>
+          <a:p>
+            <a:pPr/>
+            <a:r>
+              <a:rPr sz="2000">
+                <a:latin typeface="Calibri"/>
+              </a:rPr>
+              <a:t>Deliverables: model, toolkit, dashboard, dataset, meta-embedding, report</a:t>
+            </a:r>
+          </a:p>
+          <a:p>
+            <a:pPr/>
+            <a:r>
+              <a:rPr sz="2000">
+                <a:latin typeface="Calibri"/>
+              </a:rPr>
+              <a:t>Impact: introspective agents; multimodal fusion advances; evaluation standards</a:t>
+            </a:r>
+          </a:p>
+          <a:p>
+            <a:pPr/>
+            <a:r>
+              <a:rPr sz="2000">
+                <a:latin typeface="Calibri"/>
+              </a:rPr>
+              <a:t>API example shown on right</a:t>
+            </a:r>
+          </a:p>
+        </p:txBody>
+      </p:sp>
+      <p:sp>
+        <p:nvSpPr>
+          <p:cNvPr id="4" name="TextBox 3"/>
+          <p:cNvSpPr txBox="1"/>
+          <p:nvPr/>
+        </p:nvSpPr>
+        <p:spPr>
+          <a:xfrm>
+            <a:off x="5943600" y="1280160"/>
+            <a:ext cx="5486400" cy="2743200"/>
+          </a:xfrm>
+          <a:prstGeom prst="rect">
+            <a:avLst/>
+          </a:prstGeom>
+          <a:noFill/>
+        </p:spPr>
+        <p:txBody>
+          <a:bodyPr wrap="none">
+            <a:spAutoFit/>
+          </a:bodyPr>
           <a:lstStyle/>
           <a:p>
             <a:pPr>
-              <a:defRPr sz="2000"/>
+              <a:defRPr sz="1800">
+                <a:solidFill>
+                  <a:srgbClr val="222222"/>
+                </a:solidFill>
+                <a:latin typeface="Consolas"/>
+              </a:defRPr>
             </a:pPr>
             <a:r>
-              <a:t>Deliverables: model, toolkit, dashboard, dataset, meta-embedding, report</a:t>
-            </a:r>
-          </a:p>
-          <a:p>
-            <a:pPr>
-              <a:defRPr sz="2000"/>
-            </a:pPr>
-            <a:r>
-              <a:t>Impact: introspective agents; multimodal fusion advances; evaluation standards</a:t>
-            </a:r>
-          </a:p>
-          <a:p>
-            <a:pPr>
-              <a:defRPr sz="2000"/>
-            </a:pPr>
-            <a:r>
-              <a:t>API: encode() | query() | counterfactual()</a:t>
+              <a:t># Embedding API</a:t>
+            </a:r>
+            <a:br/>
+            <a:r>
+              <a:t>embedding = model.encode(experience)</a:t>
+            </a:r>
+            <a:br/>
+            <a:r>
+              <a:t>episodes = model.query(predicate="reward&gt;threshold and danger")</a:t>
+            </a:r>
+            <a:br/>
+            <a:r>
+              <a:t>edited = model.counterfactual(episode, objective="avoid obstacle; reach goal")</a:t>
             </a:r>
           </a:p>
         </p:txBody>
@@ -4750,7 +4932,14 @@
           <a:bodyPr/>
           <a:lstStyle/>
           <a:p>
-            <a:r>
+            <a:pPr algn="l"/>
+            <a:r>
+              <a:rPr sz="4000" b="1">
+                <a:solidFill>
+                  <a:srgbClr val="225588"/>
+                </a:solidFill>
+                <a:latin typeface="Calibri Light"/>
+              </a:rPr>
               <a:t>Budget, Risks, and Team</a:t>
             </a:r>
           </a:p>
@@ -4768,34 +4957,55 @@
         </p:nvSpPr>
         <p:spPr/>
         <p:txBody>
-          <a:bodyPr/>
-          <a:lstStyle/>
-          <a:p>
-            <a:pPr>
-              <a:defRPr sz="2000"/>
-            </a:pPr>
-            <a:r>
-              <a:t>Budget summary: stipend, compute, tools, dissemination</a:t>
-            </a:r>
-          </a:p>
-          <a:p>
-            <a:pPr>
-              <a:defRPr sz="2000"/>
-            </a:pPr>
-            <a:r>
+          <a:bodyPr lIns="0" rIns="0"/>
+          <a:lstStyle/>
+          <a:p>
+            <a:pPr/>
+            <a:r>
+              <a:rPr sz="2000">
+                <a:latin typeface="Calibri"/>
+              </a:rPr>
+              <a:t>Budget summary: stipend, compute, tools, dissemination, contingency</a:t>
+            </a:r>
+          </a:p>
+          <a:p>
+            <a:pPr/>
+            <a:r>
+              <a:rPr sz="2000">
+                <a:latin typeface="Calibri"/>
+              </a:rPr>
               <a:t>Risks &amp; mitigations: fusion alignment; fidelity vs imagination; generalization; interpretability</a:t>
             </a:r>
           </a:p>
           <a:p>
-            <a:pPr>
-              <a:defRPr sz="2000"/>
-            </a:pPr>
-            <a:r>
+            <a:pPr/>
+            <a:r>
+              <a:rPr sz="2000">
+                <a:latin typeface="Calibri"/>
+              </a:rPr>
               <a:t>Team: prior latent trajectory work; narrative phases</a:t>
             </a:r>
           </a:p>
         </p:txBody>
       </p:sp>
+      <p:graphicFrame>
+        <p:nvGraphicFramePr>
+          <p:cNvPr id="4" name="Chart 3"/>
+          <p:cNvGraphicFramePr>
+            <a:graphicFrameLocks noGrp="1"/>
+          </p:cNvGraphicFramePr>
+          <p:nvPr/>
+        </p:nvGraphicFramePr>
+        <p:xfrm>
+          <a:off x="5943600" y="1645920"/>
+          <a:ext cx="5486400" cy="3474720"/>
+        </p:xfrm>
+        <a:graphic>
+          <a:graphicData uri="http://schemas.openxmlformats.org/drawingml/2006/chart">
+            <c:chart xmlns:c="http://schemas.openxmlformats.org/drawingml/2006/chart" r:id="rId3"/>
+          </a:graphicData>
+        </a:graphic>
+      </p:graphicFrame>
     </p:spTree>
   </p:cSld>
   <p:clrMapOvr>
@@ -4829,7 +5039,14 @@
           <a:bodyPr/>
           <a:lstStyle/>
           <a:p>
-            <a:r>
+            <a:pPr algn="l"/>
+            <a:r>
+              <a:rPr sz="4000" b="1">
+                <a:solidFill>
+                  <a:srgbClr val="225588"/>
+                </a:solidFill>
+                <a:latin typeface="Calibri Light"/>
+              </a:rPr>
               <a:t>Q&amp;A</a:t>
             </a:r>
           </a:p>
@@ -4847,37 +5064,41 @@
         </p:nvSpPr>
         <p:spPr/>
         <p:txBody>
-          <a:bodyPr/>
-          <a:lstStyle/>
-          <a:p>
-            <a:pPr>
-              <a:defRPr sz="2000"/>
-            </a:pPr>
-            <a:r>
+          <a:bodyPr lIns="0" rIns="0"/>
+          <a:lstStyle/>
+          <a:p>
+            <a:pPr/>
+            <a:r>
+              <a:rPr sz="2000">
+                <a:latin typeface="Calibri"/>
+              </a:rPr>
               <a:t>Evaluation rigor &amp; thresholds</a:t>
             </a:r>
           </a:p>
           <a:p>
-            <a:pPr>
-              <a:defRPr sz="2000"/>
-            </a:pPr>
-            <a:r>
+            <a:pPr/>
+            <a:r>
+              <a:rPr sz="2000">
+                <a:latin typeface="Calibri"/>
+              </a:rPr>
               <a:t>Counterfactual criteria &amp; constraints</a:t>
             </a:r>
           </a:p>
           <a:p>
-            <a:pPr>
-              <a:defRPr sz="2000"/>
-            </a:pPr>
-            <a:r>
+            <a:pPr/>
+            <a:r>
+              <a:rPr sz="2000">
+                <a:latin typeface="Calibri"/>
+              </a:rPr>
               <a:t>Generalization &amp; transfer tests</a:t>
             </a:r>
           </a:p>
           <a:p>
-            <a:pPr>
-              <a:defRPr sz="2000"/>
-            </a:pPr>
-            <a:r>
+            <a:pPr/>
+            <a:r>
+              <a:rPr sz="2000">
+                <a:latin typeface="Calibri"/>
+              </a:rPr>
               <a:t>Dashboard demo plan</a:t>
             </a:r>
           </a:p>
@@ -4916,7 +5137,14 @@
           <a:bodyPr/>
           <a:lstStyle/>
           <a:p>
-            <a:r>
+            <a:pPr algn="l"/>
+            <a:r>
+              <a:rPr sz="4000" b="1">
+                <a:solidFill>
+                  <a:srgbClr val="225588"/>
+                </a:solidFill>
+                <a:latin typeface="Calibri Light"/>
+              </a:rPr>
               <a:t>Backup: Metrics &amp; Thresholds</a:t>
             </a:r>
           </a:p>
@@ -4934,37 +5162,41 @@
         </p:nvSpPr>
         <p:spPr/>
         <p:txBody>
-          <a:bodyPr/>
-          <a:lstStyle/>
-          <a:p>
-            <a:pPr>
-              <a:defRPr sz="2000"/>
-            </a:pPr>
-            <a:r>
+          <a:bodyPr lIns="0" rIns="0"/>
+          <a:lstStyle/>
+          <a:p>
+            <a:pPr/>
+            <a:r>
+              <a:rPr sz="2000">
+                <a:latin typeface="Calibri"/>
+              </a:rPr>
               <a:t>SSIM/MSE for recon</a:t>
             </a:r>
           </a:p>
           <a:p>
-            <a:pPr>
-              <a:defRPr sz="2000"/>
-            </a:pPr>
-            <a:r>
+            <a:pPr/>
+            <a:r>
+              <a:rPr sz="2000">
+                <a:latin typeface="Calibri"/>
+              </a:rPr>
               <a:t>NMI/Silhouette for clustering</a:t>
             </a:r>
           </a:p>
           <a:p>
-            <a:pPr>
-              <a:defRPr sz="2000"/>
-            </a:pPr>
-            <a:r>
+            <a:pPr/>
+            <a:r>
+              <a:rPr sz="2000">
+                <a:latin typeface="Calibri"/>
+              </a:rPr>
               <a:t>Curvature/ISTD for smoothness</a:t>
             </a:r>
           </a:p>
           <a:p>
-            <a:pPr>
-              <a:defRPr sz="2000"/>
-            </a:pPr>
-            <a:r>
+            <a:pPr/>
+            <a:r>
+              <a:rPr sz="2000">
+                <a:latin typeface="Calibri"/>
+              </a:rPr>
               <a:t>Retrieval Precision@K</a:t>
             </a:r>
           </a:p>
@@ -5003,7 +5235,14 @@
           <a:bodyPr/>
           <a:lstStyle/>
           <a:p>
-            <a:r>
+            <a:pPr algn="l"/>
+            <a:r>
+              <a:rPr sz="4000" b="1">
+                <a:solidFill>
+                  <a:srgbClr val="225588"/>
+                </a:solidFill>
+                <a:latin typeface="Calibri Light"/>
+              </a:rPr>
               <a:t>Backup: Counterfactual Editing</a:t>
             </a:r>
           </a:p>
@@ -5021,29 +5260,32 @@
         </p:nvSpPr>
         <p:spPr/>
         <p:txBody>
-          <a:bodyPr/>
-          <a:lstStyle/>
-          <a:p>
-            <a:pPr>
-              <a:defRPr sz="2000"/>
-            </a:pPr>
-            <a:r>
+          <a:bodyPr lIns="0" rIns="0"/>
+          <a:lstStyle/>
+          <a:p>
+            <a:pPr/>
+            <a:r>
+              <a:rPr sz="2000">
+                <a:latin typeface="Calibri"/>
+              </a:rPr>
               <a:t>Gradient-based latent optimization</a:t>
             </a:r>
           </a:p>
           <a:p>
-            <a:pPr>
-              <a:defRPr sz="2000"/>
-            </a:pPr>
-            <a:r>
+            <a:pPr/>
+            <a:r>
+              <a:rPr sz="2000">
+                <a:latin typeface="Calibri"/>
+              </a:rPr>
               <a:t>Constraints for plausibility</a:t>
             </a:r>
           </a:p>
           <a:p>
-            <a:pPr>
-              <a:defRPr sz="2000"/>
-            </a:pPr>
-            <a:r>
+            <a:pPr/>
+            <a:r>
+              <a:rPr sz="2000">
+                <a:latin typeface="Calibri"/>
+              </a:rPr>
               <a:t>Success rate &amp; reward delta</a:t>
             </a:r>
           </a:p>
@@ -5082,7 +5324,14 @@
           <a:bodyPr/>
           <a:lstStyle/>
           <a:p>
-            <a:r>
+            <a:pPr algn="l"/>
+            <a:r>
+              <a:rPr sz="4000" b="1">
+                <a:solidFill>
+                  <a:srgbClr val="225588"/>
+                </a:solidFill>
+                <a:latin typeface="Calibri Light"/>
+              </a:rPr>
               <a:t>Motivation &amp; CIMC Alignment</a:t>
             </a:r>
           </a:p>
@@ -5100,29 +5349,32 @@
         </p:nvSpPr>
         <p:spPr/>
         <p:txBody>
-          <a:bodyPr/>
-          <a:lstStyle/>
-          <a:p>
-            <a:pPr>
-              <a:defRPr sz="2000"/>
-            </a:pPr>
-            <a:r>
+          <a:bodyPr lIns="0" rIns="0"/>
+          <a:lstStyle/>
+          <a:p>
+            <a:pPr/>
+            <a:r>
+              <a:rPr sz="2000">
+                <a:latin typeface="Calibri"/>
+              </a:rPr>
               <a:t>Problem: Agents are reactive; lack introspective memory and counterfactual imagination</a:t>
             </a:r>
           </a:p>
           <a:p>
-            <a:pPr>
-              <a:defRPr sz="2000"/>
-            </a:pPr>
-            <a:r>
+            <a:pPr/>
+            <a:r>
+              <a:rPr sz="2000">
+                <a:latin typeface="Calibri"/>
+              </a:rPr>
               <a:t>Fit: Architectures for conscious agents; methodology of modeling consciousness</a:t>
             </a:r>
           </a:p>
           <a:p>
-            <a:pPr>
-              <a:defRPr sz="2000"/>
-            </a:pPr>
-            <a:r>
+            <a:pPr/>
+            <a:r>
+              <a:rPr sz="2000">
+                <a:latin typeface="Calibri"/>
+              </a:rPr>
               <a:t>Goal: From reactive to reflective agents via editable latent memories</a:t>
             </a:r>
           </a:p>
@@ -5161,7 +5413,14 @@
           <a:bodyPr/>
           <a:lstStyle/>
           <a:p>
-            <a:r>
+            <a:pPr algn="l"/>
+            <a:r>
+              <a:rPr sz="4000" b="1">
+                <a:solidFill>
+                  <a:srgbClr val="225588"/>
+                </a:solidFill>
+                <a:latin typeface="Calibri Light"/>
+              </a:rPr>
               <a:t>Objectives &amp; Key Questions</a:t>
             </a:r>
           </a:p>
@@ -5179,29 +5438,32 @@
         </p:nvSpPr>
         <p:spPr/>
         <p:txBody>
-          <a:bodyPr/>
-          <a:lstStyle/>
-          <a:p>
-            <a:pPr>
-              <a:defRPr sz="2000"/>
-            </a:pPr>
-            <a:r>
+          <a:bodyPr lIns="0" rIns="0"/>
+          <a:lstStyle/>
+          <a:p>
+            <a:pPr/>
+            <a:r>
+              <a:rPr sz="2000">
+                <a:latin typeface="Calibri"/>
+              </a:rPr>
               <a:t>Objectives: vectorized episodic memory; smooth latent trajectories; counterfactual editing</a:t>
             </a:r>
           </a:p>
           <a:p>
-            <a:pPr>
-              <a:defRPr sz="2000"/>
-            </a:pPr>
-            <a:r>
+            <a:pPr/>
+            <a:r>
+              <a:rPr sz="2000">
+                <a:latin typeface="Calibri"/>
+              </a:rPr>
               <a:t>Questions: latent structure; multimodal fusion; meaningful transformations; diagnostics</a:t>
             </a:r>
           </a:p>
           <a:p>
-            <a:pPr>
-              <a:defRPr sz="2000"/>
-            </a:pPr>
-            <a:r>
+            <a:pPr/>
+            <a:r>
+              <a:rPr sz="2000">
+                <a:latin typeface="Calibri"/>
+              </a:rPr>
               <a:t>Outcome: reusable substrate for introspective reasoning</a:t>
             </a:r>
           </a:p>
@@ -5240,7 +5502,14 @@
           <a:bodyPr/>
           <a:lstStyle/>
           <a:p>
-            <a:r>
+            <a:pPr algn="l"/>
+            <a:r>
+              <a:rPr sz="4000" b="1">
+                <a:solidFill>
+                  <a:srgbClr val="225588"/>
+                </a:solidFill>
+                <a:latin typeface="Calibri Light"/>
+              </a:rPr>
               <a:t>Novelty vs Prior Work</a:t>
             </a:r>
           </a:p>
@@ -5258,37 +5527,41 @@
         </p:nvSpPr>
         <p:spPr/>
         <p:txBody>
-          <a:bodyPr/>
-          <a:lstStyle/>
-          <a:p>
-            <a:pPr>
-              <a:defRPr sz="2000"/>
-            </a:pPr>
-            <a:r>
+          <a:bodyPr lIns="0" rIns="0"/>
+          <a:lstStyle/>
+          <a:p>
+            <a:pPr/>
+            <a:r>
+              <a:rPr sz="2000">
+                <a:latin typeface="Calibri"/>
+              </a:rPr>
               <a:t>Cross-attention fusion over simple concatenation</a:t>
             </a:r>
           </a:p>
           <a:p>
-            <a:pPr>
-              <a:defRPr sz="2000"/>
-            </a:pPr>
-            <a:r>
+            <a:pPr/>
+            <a:r>
+              <a:rPr sz="2000">
+                <a:latin typeface="Calibri"/>
+              </a:rPr>
               <a:t>Reward–affect encoding with valence shaping</a:t>
             </a:r>
           </a:p>
           <a:p>
-            <a:pPr>
-              <a:defRPr sz="2000"/>
-            </a:pPr>
-            <a:r>
+            <a:pPr/>
+            <a:r>
+              <a:rPr sz="2000">
+                <a:latin typeface="Calibri"/>
+              </a:rPr>
               <a:t>3-tier HVAE for multi-scale memory</a:t>
             </a:r>
           </a:p>
           <a:p>
-            <a:pPr>
-              <a:defRPr sz="2000"/>
-            </a:pPr>
-            <a:r>
+            <a:pPr/>
+            <a:r>
+              <a:rPr sz="2000">
+                <a:latin typeface="Calibri"/>
+              </a:rPr>
               <a:t>Latent trajectory editing (counterfactuals)</a:t>
             </a:r>
           </a:p>
@@ -5327,7 +5600,14 @@
           <a:bodyPr/>
           <a:lstStyle/>
           <a:p>
-            <a:r>
+            <a:pPr algn="l"/>
+            <a:r>
+              <a:rPr sz="4000" b="1">
+                <a:solidFill>
+                  <a:srgbClr val="225588"/>
+                </a:solidFill>
+                <a:latin typeface="Calibri Light"/>
+              </a:rPr>
               <a:t>Approach Overview</a:t>
             </a:r>
           </a:p>
@@ -5345,42 +5625,381 @@
         </p:nvSpPr>
         <p:spPr/>
         <p:txBody>
-          <a:bodyPr/>
-          <a:lstStyle/>
-          <a:p>
-            <a:pPr>
-              <a:defRPr sz="2000"/>
-            </a:pPr>
-            <a:r>
+          <a:bodyPr lIns="0" rIns="0"/>
+          <a:lstStyle/>
+          <a:p>
+            <a:pPr/>
+            <a:r>
+              <a:rPr sz="2000">
+                <a:latin typeface="Calibri"/>
+              </a:rPr>
               <a:t>Multimodal encoding</a:t>
             </a:r>
           </a:p>
           <a:p>
-            <a:pPr>
-              <a:defRPr sz="2000"/>
-            </a:pPr>
-            <a:r>
+            <a:pPr/>
+            <a:r>
+              <a:rPr sz="2000">
+                <a:latin typeface="Calibri"/>
+              </a:rPr>
               <a:t>Temporal continuity &amp; segmentation</a:t>
             </a:r>
           </a:p>
           <a:p>
-            <a:pPr>
-              <a:defRPr sz="2000"/>
-            </a:pPr>
-            <a:r>
+            <a:pPr/>
+            <a:r>
+              <a:rPr sz="2000">
+                <a:latin typeface="Calibri"/>
+              </a:rPr>
               <a:t>Hierarchical abstraction</a:t>
             </a:r>
           </a:p>
           <a:p>
-            <a:pPr>
-              <a:defRPr sz="2000"/>
-            </a:pPr>
-            <a:r>
+            <a:pPr/>
+            <a:r>
+              <a:rPr sz="2000">
+                <a:latin typeface="Calibri"/>
+              </a:rPr>
               <a:t>Evaluation &amp; diagnostics</a:t>
             </a:r>
           </a:p>
         </p:txBody>
       </p:sp>
+      <p:sp>
+        <p:nvSpPr>
+          <p:cNvPr id="4" name="Rectangle 3"/>
+          <p:cNvSpPr/>
+          <p:nvPr/>
+        </p:nvSpPr>
+        <p:spPr>
+          <a:xfrm>
+            <a:off x="457200" y="1828800"/>
+            <a:ext cx="1920240" cy="914400"/>
+          </a:xfrm>
+          <a:prstGeom prst="rect">
+            <a:avLst/>
+          </a:prstGeom>
+        </p:spPr>
+        <p:style>
+          <a:lnRef idx="1">
+            <a:schemeClr val="accent1"/>
+          </a:lnRef>
+          <a:fillRef idx="3">
+            <a:schemeClr val="accent1"/>
+          </a:fillRef>
+          <a:effectRef idx="2">
+            <a:schemeClr val="accent1"/>
+          </a:effectRef>
+          <a:fontRef idx="minor">
+            <a:schemeClr val="lt1"/>
+          </a:fontRef>
+        </p:style>
+        <p:txBody>
+          <a:bodyPr rtlCol="0" anchor="ctr" lIns="0" rIns="0"/>
+          <a:lstStyle/>
+          <a:p>
+            <a:pPr algn="ctr"/>
+            <a:r>
+              <a:rPr sz="2000">
+                <a:latin typeface="Calibri"/>
+              </a:rPr>
+              <a:t>Sensors</a:t>
+            </a:r>
+          </a:p>
+        </p:txBody>
+      </p:sp>
+      <p:sp>
+        <p:nvSpPr>
+          <p:cNvPr id="5" name="Rectangle 4"/>
+          <p:cNvSpPr/>
+          <p:nvPr/>
+        </p:nvSpPr>
+        <p:spPr>
+          <a:xfrm>
+            <a:off x="2834640" y="1828800"/>
+            <a:ext cx="1920240" cy="914400"/>
+          </a:xfrm>
+          <a:prstGeom prst="rect">
+            <a:avLst/>
+          </a:prstGeom>
+        </p:spPr>
+        <p:style>
+          <a:lnRef idx="1">
+            <a:schemeClr val="accent1"/>
+          </a:lnRef>
+          <a:fillRef idx="3">
+            <a:schemeClr val="accent1"/>
+          </a:fillRef>
+          <a:effectRef idx="2">
+            <a:schemeClr val="accent1"/>
+          </a:effectRef>
+          <a:fontRef idx="minor">
+            <a:schemeClr val="lt1"/>
+          </a:fontRef>
+        </p:style>
+        <p:txBody>
+          <a:bodyPr rtlCol="0" anchor="ctr" lIns="0" rIns="0"/>
+          <a:lstStyle/>
+          <a:p>
+            <a:pPr algn="ctr"/>
+            <a:r>
+              <a:rPr sz="2000">
+                <a:latin typeface="Calibri"/>
+              </a:rPr>
+              <a:t>Encoders</a:t>
+            </a:r>
+          </a:p>
+        </p:txBody>
+      </p:sp>
+      <p:sp>
+        <p:nvSpPr>
+          <p:cNvPr id="6" name="Rectangle 5"/>
+          <p:cNvSpPr/>
+          <p:nvPr/>
+        </p:nvSpPr>
+        <p:spPr>
+          <a:xfrm>
+            <a:off x="5212080" y="1828800"/>
+            <a:ext cx="1920240" cy="914400"/>
+          </a:xfrm>
+          <a:prstGeom prst="rect">
+            <a:avLst/>
+          </a:prstGeom>
+        </p:spPr>
+        <p:style>
+          <a:lnRef idx="1">
+            <a:schemeClr val="accent1"/>
+          </a:lnRef>
+          <a:fillRef idx="3">
+            <a:schemeClr val="accent1"/>
+          </a:fillRef>
+          <a:effectRef idx="2">
+            <a:schemeClr val="accent1"/>
+          </a:effectRef>
+          <a:fontRef idx="minor">
+            <a:schemeClr val="lt1"/>
+          </a:fontRef>
+        </p:style>
+        <p:txBody>
+          <a:bodyPr rtlCol="0" anchor="ctr" lIns="0" rIns="0"/>
+          <a:lstStyle/>
+          <a:p>
+            <a:pPr algn="ctr"/>
+            <a:r>
+              <a:rPr sz="2000">
+                <a:latin typeface="Calibri"/>
+              </a:rPr>
+              <a:t>HVAE</a:t>
+            </a:r>
+          </a:p>
+        </p:txBody>
+      </p:sp>
+      <p:sp>
+        <p:nvSpPr>
+          <p:cNvPr id="7" name="Rectangle 6"/>
+          <p:cNvSpPr/>
+          <p:nvPr/>
+        </p:nvSpPr>
+        <p:spPr>
+          <a:xfrm>
+            <a:off x="7589520" y="1828800"/>
+            <a:ext cx="1920240" cy="914400"/>
+          </a:xfrm>
+          <a:prstGeom prst="rect">
+            <a:avLst/>
+          </a:prstGeom>
+        </p:spPr>
+        <p:style>
+          <a:lnRef idx="1">
+            <a:schemeClr val="accent1"/>
+          </a:lnRef>
+          <a:fillRef idx="3">
+            <a:schemeClr val="accent1"/>
+          </a:fillRef>
+          <a:effectRef idx="2">
+            <a:schemeClr val="accent1"/>
+          </a:effectRef>
+          <a:fontRef idx="minor">
+            <a:schemeClr val="lt1"/>
+          </a:fontRef>
+        </p:style>
+        <p:txBody>
+          <a:bodyPr rtlCol="0" anchor="ctr" lIns="0" rIns="0"/>
+          <a:lstStyle/>
+          <a:p>
+            <a:pPr algn="ctr"/>
+            <a:r>
+              <a:rPr sz="2000">
+                <a:latin typeface="Calibri"/>
+              </a:rPr>
+              <a:t>Counterfactuals</a:t>
+            </a:r>
+          </a:p>
+        </p:txBody>
+      </p:sp>
+      <p:sp>
+        <p:nvSpPr>
+          <p:cNvPr id="8" name="Rectangle 7"/>
+          <p:cNvSpPr/>
+          <p:nvPr/>
+        </p:nvSpPr>
+        <p:spPr>
+          <a:xfrm>
+            <a:off x="9966960" y="1828800"/>
+            <a:ext cx="1920240" cy="914400"/>
+          </a:xfrm>
+          <a:prstGeom prst="rect">
+            <a:avLst/>
+          </a:prstGeom>
+        </p:spPr>
+        <p:style>
+          <a:lnRef idx="1">
+            <a:schemeClr val="accent1"/>
+          </a:lnRef>
+          <a:fillRef idx="3">
+            <a:schemeClr val="accent1"/>
+          </a:fillRef>
+          <a:effectRef idx="2">
+            <a:schemeClr val="accent1"/>
+          </a:effectRef>
+          <a:fontRef idx="minor">
+            <a:schemeClr val="lt1"/>
+          </a:fontRef>
+        </p:style>
+        <p:txBody>
+          <a:bodyPr rtlCol="0" anchor="ctr" lIns="0" rIns="0"/>
+          <a:lstStyle/>
+          <a:p>
+            <a:pPr algn="ctr"/>
+            <a:r>
+              <a:rPr sz="2000">
+                <a:latin typeface="Calibri"/>
+              </a:rPr>
+              <a:t>Decoder</a:t>
+            </a:r>
+          </a:p>
+        </p:txBody>
+      </p:sp>
+      <p:cxnSp>
+        <p:nvCxnSpPr>
+          <p:cNvPr id="9" name="Connector 8"/>
+          <p:cNvCxnSpPr/>
+          <p:nvPr/>
+        </p:nvCxnSpPr>
+        <p:spPr>
+          <a:xfrm>
+            <a:off x="2377440" y="2286000"/>
+            <a:ext cx="457200" cy="0"/>
+          </a:xfrm>
+          <a:prstGeom prst="bentConnector3">
+            <a:avLst/>
+          </a:prstGeom>
+        </p:spPr>
+        <p:style>
+          <a:lnRef idx="2">
+            <a:schemeClr val="accent1"/>
+          </a:lnRef>
+          <a:fillRef idx="0">
+            <a:schemeClr val="accent1"/>
+          </a:fillRef>
+          <a:effectRef idx="1">
+            <a:schemeClr val="accent1"/>
+          </a:effectRef>
+          <a:fontRef idx="minor">
+            <a:schemeClr val="tx1"/>
+          </a:fontRef>
+        </p:style>
+      </p:cxnSp>
+      <p:cxnSp>
+        <p:nvCxnSpPr>
+          <p:cNvPr id="10" name="Connector 9"/>
+          <p:cNvCxnSpPr/>
+          <p:nvPr/>
+        </p:nvCxnSpPr>
+        <p:spPr>
+          <a:xfrm>
+            <a:off x="4754880" y="2286000"/>
+            <a:ext cx="457200" cy="0"/>
+          </a:xfrm>
+          <a:prstGeom prst="bentConnector3">
+            <a:avLst/>
+          </a:prstGeom>
+        </p:spPr>
+        <p:style>
+          <a:lnRef idx="2">
+            <a:schemeClr val="accent1"/>
+          </a:lnRef>
+          <a:fillRef idx="0">
+            <a:schemeClr val="accent1"/>
+          </a:fillRef>
+          <a:effectRef idx="1">
+            <a:schemeClr val="accent1"/>
+          </a:effectRef>
+          <a:fontRef idx="minor">
+            <a:schemeClr val="tx1"/>
+          </a:fontRef>
+        </p:style>
+      </p:cxnSp>
+      <p:cxnSp>
+        <p:nvCxnSpPr>
+          <p:cNvPr id="11" name="Connector 10"/>
+          <p:cNvCxnSpPr/>
+          <p:nvPr/>
+        </p:nvCxnSpPr>
+        <p:spPr>
+          <a:xfrm>
+            <a:off x="7132320" y="2286000"/>
+            <a:ext cx="457200" cy="0"/>
+          </a:xfrm>
+          <a:prstGeom prst="bentConnector3">
+            <a:avLst/>
+          </a:prstGeom>
+        </p:spPr>
+        <p:style>
+          <a:lnRef idx="2">
+            <a:schemeClr val="accent1"/>
+          </a:lnRef>
+          <a:fillRef idx="0">
+            <a:schemeClr val="accent1"/>
+          </a:fillRef>
+          <a:effectRef idx="1">
+            <a:schemeClr val="accent1"/>
+          </a:effectRef>
+          <a:fontRef idx="minor">
+            <a:schemeClr val="tx1"/>
+          </a:fontRef>
+        </p:style>
+      </p:cxnSp>
+      <p:cxnSp>
+        <p:nvCxnSpPr>
+          <p:cNvPr id="12" name="Connector 11"/>
+          <p:cNvCxnSpPr/>
+          <p:nvPr/>
+        </p:nvCxnSpPr>
+        <p:spPr>
+          <a:xfrm>
+            <a:off x="9509760" y="2286000"/>
+            <a:ext cx="457200" cy="0"/>
+          </a:xfrm>
+          <a:prstGeom prst="bentConnector3">
+            <a:avLst/>
+          </a:prstGeom>
+        </p:spPr>
+        <p:style>
+          <a:lnRef idx="2">
+            <a:schemeClr val="accent1"/>
+          </a:lnRef>
+          <a:fillRef idx="0">
+            <a:schemeClr val="accent1"/>
+          </a:fillRef>
+          <a:effectRef idx="1">
+            <a:schemeClr val="accent1"/>
+          </a:effectRef>
+          <a:fontRef idx="minor">
+            <a:schemeClr val="tx1"/>
+          </a:fontRef>
+        </p:style>
+      </p:cxnSp>
     </p:spTree>
   </p:cSld>
   <p:clrMapOvr>
@@ -5414,7 +6033,14 @@
           <a:bodyPr/>
           <a:lstStyle/>
           <a:p>
-            <a:r>
+            <a:pPr algn="l"/>
+            <a:r>
+              <a:rPr sz="4000" b="1">
+                <a:solidFill>
+                  <a:srgbClr val="225588"/>
+                </a:solidFill>
+                <a:latin typeface="Calibri Light"/>
+              </a:rPr>
               <a:t>Multimodal Encoding</a:t>
             </a:r>
           </a:p>
@@ -5432,30 +6058,33 @@
         </p:nvSpPr>
         <p:spPr/>
         <p:txBody>
-          <a:bodyPr/>
-          <a:lstStyle/>
-          <a:p>
-            <a:pPr>
-              <a:defRPr sz="2000"/>
-            </a:pPr>
-            <a:r>
-              <a:t>Cross-attention fusion; modality dropout for robustness</a:t>
-            </a:r>
-          </a:p>
-          <a:p>
-            <a:pPr>
-              <a:defRPr sz="2000"/>
-            </a:pPr>
-            <a:r>
+          <a:bodyPr lIns="0" rIns="0"/>
+          <a:lstStyle/>
+          <a:p>
+            <a:pPr/>
+            <a:r>
+              <a:rPr sz="2000">
+                <a:latin typeface="Calibri"/>
+              </a:rPr>
+              <a:t>Cross-attention fusion; modality dropout</a:t>
+            </a:r>
+          </a:p>
+          <a:p>
+            <a:pPr/>
+            <a:r>
+              <a:rPr sz="2000">
+                <a:latin typeface="Calibri"/>
+              </a:rPr>
               <a:t>Reward–affect encoder with contrastive valence loss</a:t>
             </a:r>
           </a:p>
           <a:p>
-            <a:pPr>
-              <a:defRPr sz="2000"/>
-            </a:pPr>
-            <a:r>
-              <a:t>Decoder reconstructs full tuples to avoid channel neglect</a:t>
+            <a:pPr/>
+            <a:r>
+              <a:rPr sz="2000">
+                <a:latin typeface="Calibri"/>
+              </a:rPr>
+              <a:t>Full-tuple reconstruction to avoid channel neglect</a:t>
             </a:r>
           </a:p>
         </p:txBody>
@@ -5493,7 +6122,14 @@
           <a:bodyPr/>
           <a:lstStyle/>
           <a:p>
-            <a:r>
+            <a:pPr algn="l"/>
+            <a:r>
+              <a:rPr sz="4000" b="1">
+                <a:solidFill>
+                  <a:srgbClr val="225588"/>
+                </a:solidFill>
+                <a:latin typeface="Calibri Light"/>
+              </a:rPr>
               <a:t>Temporal Continuity &amp; Segmentation</a:t>
             </a:r>
           </a:p>
@@ -5511,29 +6147,32 @@
         </p:nvSpPr>
         <p:spPr/>
         <p:txBody>
-          <a:bodyPr/>
-          <a:lstStyle/>
-          <a:p>
-            <a:pPr>
-              <a:defRPr sz="2000"/>
-            </a:pPr>
-            <a:r>
-              <a:t>Sequence encoders (Transformer/LSTM/GRU) with smoothness regularization</a:t>
-            </a:r>
-          </a:p>
-          <a:p>
-            <a:pPr>
-              <a:defRPr sz="2000"/>
-            </a:pPr>
-            <a:r>
+          <a:bodyPr lIns="0" rIns="0"/>
+          <a:lstStyle/>
+          <a:p>
+            <a:pPr/>
+            <a:r>
+              <a:rPr sz="2000">
+                <a:latin typeface="Calibri"/>
+              </a:rPr>
+              <a:t>Sequence encoders with smoothness regularization</a:t>
+            </a:r>
+          </a:p>
+          <a:p>
+            <a:pPr/>
+            <a:r>
+              <a:rPr sz="2000">
+                <a:latin typeface="Calibri"/>
+              </a:rPr>
               <a:t>Surprise-based event boundaries; attention pooling</a:t>
             </a:r>
           </a:p>
           <a:p>
-            <a:pPr>
-              <a:defRPr sz="2000"/>
-            </a:pPr>
-            <a:r>
+            <a:pPr/>
+            <a:r>
+              <a:rPr sz="2000">
+                <a:latin typeface="Calibri"/>
+              </a:rPr>
               <a:t>DTW/Soft-DTW latent trajectory alignment</a:t>
             </a:r>
           </a:p>
@@ -5572,7 +6211,14 @@
           <a:bodyPr/>
           <a:lstStyle/>
           <a:p>
-            <a:r>
+            <a:pPr algn="l"/>
+            <a:r>
+              <a:rPr sz="4000" b="1">
+                <a:solidFill>
+                  <a:srgbClr val="225588"/>
+                </a:solidFill>
+                <a:latin typeface="Calibri Light"/>
+              </a:rPr>
               <a:t>Hierarchical Abstraction</a:t>
             </a:r>
           </a:p>
@@ -5590,29 +6236,32 @@
         </p:nvSpPr>
         <p:spPr/>
         <p:txBody>
-          <a:bodyPr/>
-          <a:lstStyle/>
-          <a:p>
-            <a:pPr>
-              <a:defRPr sz="2000"/>
-            </a:pPr>
-            <a:r>
+          <a:bodyPr lIns="0" rIns="0"/>
+          <a:lstStyle/>
+          <a:p>
+            <a:pPr/>
+            <a:r>
+              <a:rPr sz="2000">
+                <a:latin typeface="Calibri"/>
+              </a:rPr>
               <a:t>3-tier HVAE: z1 sensorimotor; z2 segments; z3 conceptual</a:t>
             </a:r>
           </a:p>
           <a:p>
-            <a:pPr>
-              <a:defRPr sz="2000"/>
-            </a:pPr>
-            <a:r>
-              <a:t>Attention-based abstraction and self-supervised tasks</a:t>
-            </a:r>
-          </a:p>
-          <a:p>
-            <a:pPr>
-              <a:defRPr sz="2000"/>
-            </a:pPr>
-            <a:r>
+            <a:pPr/>
+            <a:r>
+              <a:rPr sz="2000">
+                <a:latin typeface="Calibri"/>
+              </a:rPr>
+              <a:t>Attention-based abstraction and auxiliary tasks</a:t>
+            </a:r>
+          </a:p>
+          <a:p>
+            <a:pPr/>
+            <a:r>
+              <a:rPr sz="2000">
+                <a:latin typeface="Calibri"/>
+              </a:rPr>
               <a:t>Drill-down/roll-up consistency checks</a:t>
             </a:r>
           </a:p>
@@ -5651,7 +6300,14 @@
           <a:bodyPr/>
           <a:lstStyle/>
           <a:p>
-            <a:r>
+            <a:pPr algn="l"/>
+            <a:r>
+              <a:rPr sz="4000" b="1">
+                <a:solidFill>
+                  <a:srgbClr val="225588"/>
+                </a:solidFill>
+                <a:latin typeface="Calibri Light"/>
+              </a:rPr>
               <a:t>Evaluation &amp; Diagnostics</a:t>
             </a:r>
           </a:p>
@@ -5669,34 +6325,61 @@
         </p:nvSpPr>
         <p:spPr/>
         <p:txBody>
-          <a:bodyPr/>
-          <a:lstStyle/>
-          <a:p>
-            <a:pPr>
-              <a:defRPr sz="2000"/>
-            </a:pPr>
-            <a:r>
+          <a:bodyPr lIns="0" rIns="0"/>
+          <a:lstStyle/>
+          <a:p>
+            <a:pPr/>
+            <a:r>
+              <a:rPr sz="2000">
+                <a:latin typeface="Calibri"/>
+              </a:rPr>
               <a:t>Reconstruction, clustering (NMI), temporal coherence</a:t>
             </a:r>
           </a:p>
           <a:p>
-            <a:pPr>
-              <a:defRPr sz="2000"/>
-            </a:pPr>
-            <a:r>
+            <a:pPr/>
+            <a:r>
+              <a:rPr sz="2000">
+                <a:latin typeface="Calibri"/>
+              </a:rPr>
               <a:t>Traversal &amp; perturbation tests; retrieval@K</a:t>
             </a:r>
           </a:p>
           <a:p>
-            <a:pPr>
-              <a:defRPr sz="2000"/>
-            </a:pPr>
-            <a:r>
+            <a:pPr/>
+            <a:r>
+              <a:rPr sz="2000">
+                <a:latin typeface="Calibri"/>
+              </a:rPr>
               <a:t>Counterfactual success: plausibility, human ratings, reward Δ</a:t>
             </a:r>
           </a:p>
         </p:txBody>
       </p:sp>
+      <p:pic>
+        <p:nvPicPr>
+          <p:cNvPr id="4" name="Picture 3" descr="umap_example.png"/>
+          <p:cNvPicPr>
+            <a:picLocks noChangeAspect="1"/>
+          </p:cNvPicPr>
+          <p:nvPr/>
+        </p:nvPicPr>
+        <p:blipFill>
+          <a:blip r:embed="rId3"/>
+          <a:stretch>
+            <a:fillRect/>
+          </a:stretch>
+        </p:blipFill>
+        <p:spPr>
+          <a:xfrm>
+            <a:off x="5943600" y="1280160"/>
+            <a:ext cx="5486400" cy="3657600"/>
+          </a:xfrm>
+          <a:prstGeom prst="rect">
+            <a:avLst/>
+          </a:prstGeom>
+        </p:spPr>
+      </p:pic>
     </p:spTree>
   </p:cSld>
   <p:clrMapOvr>

</xml_diff>

<commit_message>
Add sidebar bullets and hyperlink to motivation slide in CIMC presentation
Co-authored-by: csmangum <csmangum@gmail.com>
</commit_message>
<xml_diff>
--- a/CIMC_Proposal_Presentation.pptx
+++ b/CIMC_Proposal_Presentation.pptx
@@ -5376,6 +5376,93 @@
                 <a:latin typeface="Calibri"/>
               </a:rPr>
               <a:t>Goal: From reactive to reflective agents via editable latent memories</a:t>
+            </a:r>
+          </a:p>
+          <a:p>
+            <a:r>
+              <a:rPr sz="1800">
+                <a:solidFill>
+                  <a:srgbClr val="225588"/>
+                </a:solidFill>
+                <a:latin typeface="Calibri"/>
+                <a:hlinkClick r:id="rId3"/>
+              </a:rPr>
+              <a:t>CIMC Call for Proposals</a:t>
+            </a:r>
+          </a:p>
+        </p:txBody>
+      </p:sp>
+      <p:sp>
+        <p:nvSpPr>
+          <p:cNvPr id="4" name="TextBox 3"/>
+          <p:cNvSpPr txBox="1"/>
+          <p:nvPr/>
+        </p:nvSpPr>
+        <p:spPr>
+          <a:xfrm>
+            <a:off x="5943600" y="1280160"/>
+            <a:ext cx="5486400" cy="3200400"/>
+          </a:xfrm>
+          <a:prstGeom prst="rect">
+            <a:avLst/>
+          </a:prstGeom>
+          <a:noFill/>
+        </p:spPr>
+        <p:txBody>
+          <a:bodyPr wrap="none">
+            <a:spAutoFit/>
+          </a:bodyPr>
+          <a:lstStyle/>
+          <a:p>
+            <a:pPr>
+              <a:spcAft>
+                <a:spcPts val="600"/>
+              </a:spcAft>
+            </a:pPr>
+            <a:r>
+              <a:rPr sz="2000" b="1">
+                <a:solidFill>
+                  <a:srgbClr val="225588"/>
+                </a:solidFill>
+                <a:latin typeface="Calibri Light"/>
+              </a:rPr>
+              <a:t>CIMC focus areas (aligned)</a:t>
+            </a:r>
+          </a:p>
+          <a:p>
+            <a:pPr/>
+            <a:r>
+              <a:rPr sz="1600">
+                <a:latin typeface="Calibri"/>
+              </a:rPr>
+              <a:t>Architectures for conscious agents</a:t>
+            </a:r>
+          </a:p>
+          <a:p>
+            <a:pPr/>
+            <a:r>
+              <a:rPr sz="1600">
+                <a:latin typeface="Calibri"/>
+              </a:rPr>
+              <a:t>Methodology of modeling consciousness</a:t>
+            </a:r>
+          </a:p>
+          <a:p>
+            <a:pPr/>
+            <a:r>
+              <a:rPr sz="1600">
+                <a:latin typeface="Calibri"/>
+              </a:rPr>
+              <a:t>Emergence &amp; role of self in learning agents</a:t>
+            </a:r>
+          </a:p>
+          <a:p>
+            <a:pPr/>
+            <a:r>
+              <a:rPr sz="1600">
+                <a:latin typeface="Calibri"/>
+              </a:rPr>
+              <a:t>Environments for intelligent behavior</a:t>
             </a:r>
           </a:p>
         </p:txBody>

</xml_diff>

<commit_message>
Add visual diagrams and tables to CIMC proposal presentation slides
Co-authored-by: csmangum <csmangum@gmail.com>
</commit_message>
<xml_diff>
--- a/CIMC_Proposal_Presentation.pptx
+++ b/CIMC_Proposal_Presentation.pptx
@@ -4762,6 +4762,386 @@
           </a:p>
         </p:txBody>
       </p:sp>
+      <p:sp>
+        <p:nvSpPr>
+          <p:cNvPr id="4" name="Rectangle 3"/>
+          <p:cNvSpPr/>
+          <p:nvPr/>
+        </p:nvSpPr>
+        <p:spPr>
+          <a:xfrm>
+            <a:off x="457200" y="3657600"/>
+            <a:ext cx="1975104" cy="365760"/>
+          </a:xfrm>
+          <a:prstGeom prst="rect">
+            <a:avLst/>
+          </a:prstGeom>
+          <a:solidFill>
+            <a:srgbClr val="225588"/>
+          </a:solidFill>
+          <a:ln>
+            <a:solidFill>
+              <a:srgbClr val="FFFFFF"/>
+            </a:solidFill>
+          </a:ln>
+        </p:spPr>
+        <p:style>
+          <a:lnRef idx="1">
+            <a:schemeClr val="accent1"/>
+          </a:lnRef>
+          <a:fillRef idx="3">
+            <a:schemeClr val="accent1"/>
+          </a:fillRef>
+          <a:effectRef idx="2">
+            <a:schemeClr val="accent1"/>
+          </a:effectRef>
+          <a:fontRef idx="minor">
+            <a:schemeClr val="lt1"/>
+          </a:fontRef>
+        </p:style>
+        <p:txBody>
+          <a:bodyPr rtlCol="0" anchor="ctr"/>
+          <a:lstStyle/>
+          <a:p>
+            <a:pPr algn="ctr"/>
+          </a:p>
+        </p:txBody>
+      </p:sp>
+      <p:sp>
+        <p:nvSpPr>
+          <p:cNvPr id="5" name="TextBox 4"/>
+          <p:cNvSpPr txBox="1"/>
+          <p:nvPr/>
+        </p:nvSpPr>
+        <p:spPr>
+          <a:xfrm>
+            <a:off x="548640" y="3611880"/>
+            <a:ext cx="4572000" cy="365760"/>
+          </a:xfrm>
+          <a:prstGeom prst="rect">
+            <a:avLst/>
+          </a:prstGeom>
+          <a:noFill/>
+        </p:spPr>
+        <p:txBody>
+          <a:bodyPr wrap="none">
+            <a:spAutoFit/>
+          </a:bodyPr>
+          <a:lstStyle/>
+          <a:p>
+            <a:r>
+              <a:rPr sz="1400">
+                <a:latin typeface="Calibri"/>
+              </a:rPr>
+              <a:t>Foundation</a:t>
+            </a:r>
+          </a:p>
+        </p:txBody>
+      </p:sp>
+      <p:sp>
+        <p:nvSpPr>
+          <p:cNvPr id="6" name="Rectangle 5"/>
+          <p:cNvSpPr/>
+          <p:nvPr/>
+        </p:nvSpPr>
+        <p:spPr>
+          <a:xfrm>
+            <a:off x="2432304" y="4251960"/>
+            <a:ext cx="1865376" cy="365760"/>
+          </a:xfrm>
+          <a:prstGeom prst="rect">
+            <a:avLst/>
+          </a:prstGeom>
+          <a:solidFill>
+            <a:srgbClr val="225588"/>
+          </a:solidFill>
+          <a:ln>
+            <a:solidFill>
+              <a:srgbClr val="FFFFFF"/>
+            </a:solidFill>
+          </a:ln>
+        </p:spPr>
+        <p:style>
+          <a:lnRef idx="1">
+            <a:schemeClr val="accent1"/>
+          </a:lnRef>
+          <a:fillRef idx="3">
+            <a:schemeClr val="accent1"/>
+          </a:fillRef>
+          <a:effectRef idx="2">
+            <a:schemeClr val="accent1"/>
+          </a:effectRef>
+          <a:fontRef idx="minor">
+            <a:schemeClr val="lt1"/>
+          </a:fontRef>
+        </p:style>
+        <p:txBody>
+          <a:bodyPr rtlCol="0" anchor="ctr"/>
+          <a:lstStyle/>
+          <a:p>
+            <a:pPr algn="ctr"/>
+          </a:p>
+        </p:txBody>
+      </p:sp>
+      <p:sp>
+        <p:nvSpPr>
+          <p:cNvPr id="7" name="TextBox 6"/>
+          <p:cNvSpPr txBox="1"/>
+          <p:nvPr/>
+        </p:nvSpPr>
+        <p:spPr>
+          <a:xfrm>
+            <a:off x="548640" y="4206240"/>
+            <a:ext cx="4572000" cy="365760"/>
+          </a:xfrm>
+          <a:prstGeom prst="rect">
+            <a:avLst/>
+          </a:prstGeom>
+          <a:noFill/>
+        </p:spPr>
+        <p:txBody>
+          <a:bodyPr wrap="none">
+            <a:spAutoFit/>
+          </a:bodyPr>
+          <a:lstStyle/>
+          <a:p>
+            <a:r>
+              <a:rPr sz="1400">
+                <a:latin typeface="Calibri"/>
+              </a:rPr>
+              <a:t>Core Dev</a:t>
+            </a:r>
+          </a:p>
+        </p:txBody>
+      </p:sp>
+      <p:sp>
+        <p:nvSpPr>
+          <p:cNvPr id="8" name="Rectangle 7"/>
+          <p:cNvSpPr/>
+          <p:nvPr/>
+        </p:nvSpPr>
+        <p:spPr>
+          <a:xfrm>
+            <a:off x="4297679" y="4846320"/>
+            <a:ext cx="2194560" cy="365760"/>
+          </a:xfrm>
+          <a:prstGeom prst="rect">
+            <a:avLst/>
+          </a:prstGeom>
+          <a:solidFill>
+            <a:srgbClr val="225588"/>
+          </a:solidFill>
+          <a:ln>
+            <a:solidFill>
+              <a:srgbClr val="FFFFFF"/>
+            </a:solidFill>
+          </a:ln>
+        </p:spPr>
+        <p:style>
+          <a:lnRef idx="1">
+            <a:schemeClr val="accent1"/>
+          </a:lnRef>
+          <a:fillRef idx="3">
+            <a:schemeClr val="accent1"/>
+          </a:fillRef>
+          <a:effectRef idx="2">
+            <a:schemeClr val="accent1"/>
+          </a:effectRef>
+          <a:fontRef idx="minor">
+            <a:schemeClr val="lt1"/>
+          </a:fontRef>
+        </p:style>
+        <p:txBody>
+          <a:bodyPr rtlCol="0" anchor="ctr"/>
+          <a:lstStyle/>
+          <a:p>
+            <a:pPr algn="ctr"/>
+          </a:p>
+        </p:txBody>
+      </p:sp>
+      <p:sp>
+        <p:nvSpPr>
+          <p:cNvPr id="9" name="TextBox 8"/>
+          <p:cNvSpPr txBox="1"/>
+          <p:nvPr/>
+        </p:nvSpPr>
+        <p:spPr>
+          <a:xfrm>
+            <a:off x="548640" y="4800600"/>
+            <a:ext cx="4572000" cy="365760"/>
+          </a:xfrm>
+          <a:prstGeom prst="rect">
+            <a:avLst/>
+          </a:prstGeom>
+          <a:noFill/>
+        </p:spPr>
+        <p:txBody>
+          <a:bodyPr wrap="none">
+            <a:spAutoFit/>
+          </a:bodyPr>
+          <a:lstStyle/>
+          <a:p>
+            <a:r>
+              <a:rPr sz="1400">
+                <a:latin typeface="Calibri"/>
+              </a:rPr>
+              <a:t>Temporal+Hierarchy</a:t>
+            </a:r>
+          </a:p>
+        </p:txBody>
+      </p:sp>
+      <p:sp>
+        <p:nvSpPr>
+          <p:cNvPr id="10" name="Rectangle 9"/>
+          <p:cNvSpPr/>
+          <p:nvPr/>
+        </p:nvSpPr>
+        <p:spPr>
+          <a:xfrm>
+            <a:off x="6492240" y="5440680"/>
+            <a:ext cx="2194559" cy="365760"/>
+          </a:xfrm>
+          <a:prstGeom prst="rect">
+            <a:avLst/>
+          </a:prstGeom>
+          <a:solidFill>
+            <a:srgbClr val="225588"/>
+          </a:solidFill>
+          <a:ln>
+            <a:solidFill>
+              <a:srgbClr val="FFFFFF"/>
+            </a:solidFill>
+          </a:ln>
+        </p:spPr>
+        <p:style>
+          <a:lnRef idx="1">
+            <a:schemeClr val="accent1"/>
+          </a:lnRef>
+          <a:fillRef idx="3">
+            <a:schemeClr val="accent1"/>
+          </a:fillRef>
+          <a:effectRef idx="2">
+            <a:schemeClr val="accent1"/>
+          </a:effectRef>
+          <a:fontRef idx="minor">
+            <a:schemeClr val="lt1"/>
+          </a:fontRef>
+        </p:style>
+        <p:txBody>
+          <a:bodyPr rtlCol="0" anchor="ctr"/>
+          <a:lstStyle/>
+          <a:p>
+            <a:pPr algn="ctr"/>
+          </a:p>
+        </p:txBody>
+      </p:sp>
+      <p:sp>
+        <p:nvSpPr>
+          <p:cNvPr id="11" name="TextBox 10"/>
+          <p:cNvSpPr txBox="1"/>
+          <p:nvPr/>
+        </p:nvSpPr>
+        <p:spPr>
+          <a:xfrm>
+            <a:off x="548640" y="5394960"/>
+            <a:ext cx="4572000" cy="365760"/>
+          </a:xfrm>
+          <a:prstGeom prst="rect">
+            <a:avLst/>
+          </a:prstGeom>
+          <a:noFill/>
+        </p:spPr>
+        <p:txBody>
+          <a:bodyPr wrap="none">
+            <a:spAutoFit/>
+          </a:bodyPr>
+          <a:lstStyle/>
+          <a:p>
+            <a:r>
+              <a:rPr sz="1400">
+                <a:latin typeface="Calibri"/>
+              </a:rPr>
+              <a:t>Eval &amp; Validation</a:t>
+            </a:r>
+          </a:p>
+        </p:txBody>
+      </p:sp>
+      <p:sp>
+        <p:nvSpPr>
+          <p:cNvPr id="12" name="Rectangle 11"/>
+          <p:cNvSpPr/>
+          <p:nvPr/>
+        </p:nvSpPr>
+        <p:spPr>
+          <a:xfrm>
+            <a:off x="8686800" y="6035040"/>
+            <a:ext cx="2743200" cy="365760"/>
+          </a:xfrm>
+          <a:prstGeom prst="rect">
+            <a:avLst/>
+          </a:prstGeom>
+          <a:solidFill>
+            <a:srgbClr val="225588"/>
+          </a:solidFill>
+          <a:ln>
+            <a:solidFill>
+              <a:srgbClr val="FFFFFF"/>
+            </a:solidFill>
+          </a:ln>
+        </p:spPr>
+        <p:style>
+          <a:lnRef idx="1">
+            <a:schemeClr val="accent1"/>
+          </a:lnRef>
+          <a:fillRef idx="3">
+            <a:schemeClr val="accent1"/>
+          </a:fillRef>
+          <a:effectRef idx="2">
+            <a:schemeClr val="accent1"/>
+          </a:effectRef>
+          <a:fontRef idx="minor">
+            <a:schemeClr val="lt1"/>
+          </a:fontRef>
+        </p:style>
+        <p:txBody>
+          <a:bodyPr rtlCol="0" anchor="ctr"/>
+          <a:lstStyle/>
+          <a:p>
+            <a:pPr algn="ctr"/>
+          </a:p>
+        </p:txBody>
+      </p:sp>
+      <p:sp>
+        <p:nvSpPr>
+          <p:cNvPr id="13" name="TextBox 12"/>
+          <p:cNvSpPr txBox="1"/>
+          <p:nvPr/>
+        </p:nvSpPr>
+        <p:spPr>
+          <a:xfrm>
+            <a:off x="548640" y="5989320"/>
+            <a:ext cx="4572000" cy="365760"/>
+          </a:xfrm>
+          <a:prstGeom prst="rect">
+            <a:avLst/>
+          </a:prstGeom>
+          <a:noFill/>
+        </p:spPr>
+        <p:txBody>
+          <a:bodyPr wrap="none">
+            <a:spAutoFit/>
+          </a:bodyPr>
+          <a:lstStyle/>
+          <a:p>
+            <a:r>
+              <a:rPr sz="1400">
+                <a:latin typeface="Calibri"/>
+              </a:rPr>
+              <a:t>Integration &amp; Demo</a:t>
+            </a:r>
+          </a:p>
+        </p:txBody>
+      </p:sp>
     </p:spTree>
   </p:cSld>
   <p:clrMapOvr>
@@ -5542,16 +5922,82 @@
               <a:rPr sz="2000">
                 <a:latin typeface="Calibri"/>
               </a:rPr>
-              <a:t>Questions: latent structure; multimodal fusion; meaningful transformations; diagnostics</a:t>
+              <a:t>Outcome: reusable substrate for introspective reasoning</a:t>
+            </a:r>
+          </a:p>
+        </p:txBody>
+      </p:sp>
+      <p:sp>
+        <p:nvSpPr>
+          <p:cNvPr id="4" name="TextBox 3"/>
+          <p:cNvSpPr txBox="1"/>
+          <p:nvPr/>
+        </p:nvSpPr>
+        <p:spPr>
+          <a:xfrm>
+            <a:off x="5943600" y="1280160"/>
+            <a:ext cx="5486400" cy="3200400"/>
+          </a:xfrm>
+          <a:prstGeom prst="rect">
+            <a:avLst/>
+          </a:prstGeom>
+          <a:noFill/>
+        </p:spPr>
+        <p:txBody>
+          <a:bodyPr wrap="none">
+            <a:spAutoFit/>
+          </a:bodyPr>
+          <a:lstStyle/>
+          <a:p>
+            <a:pPr>
+              <a:spcAft>
+                <a:spcPts val="600"/>
+              </a:spcAft>
+            </a:pPr>
+            <a:r>
+              <a:rPr sz="2000" b="1">
+                <a:solidFill>
+                  <a:srgbClr val="225588"/>
+                </a:solidFill>
+                <a:latin typeface="Calibri Light"/>
+              </a:rPr>
+              <a:t>Key questions</a:t>
             </a:r>
           </a:p>
           <a:p>
             <a:pPr/>
             <a:r>
-              <a:rPr sz="2000">
+              <a:rPr sz="1600">
                 <a:latin typeface="Calibri"/>
               </a:rPr>
-              <a:t>Outcome: reusable substrate for introspective reasoning</a:t>
+              <a:t>What latent structures preserve semantic + temporal coherence?</a:t>
+            </a:r>
+          </a:p>
+          <a:p>
+            <a:pPr/>
+            <a:r>
+              <a:rPr sz="1600">
+                <a:latin typeface="Calibri"/>
+              </a:rPr>
+              <a:t>How to fuse multimodal signals into aligned representations?</a:t>
+            </a:r>
+          </a:p>
+          <a:p>
+            <a:pPr/>
+            <a:r>
+              <a:rPr sz="1600">
+                <a:latin typeface="Calibri"/>
+              </a:rPr>
+              <a:t>Can we perform meaningful counterfactual transformations?</a:t>
+            </a:r>
+          </a:p>
+          <a:p>
+            <a:pPr/>
+            <a:r>
+              <a:rPr sz="1600">
+                <a:latin typeface="Calibri"/>
+              </a:rPr>
+              <a:t>What diagnostics reveal cognitive usefulness?</a:t>
             </a:r>
           </a:p>
         </p:txBody>
@@ -5654,6 +6100,418 @@
           </a:p>
         </p:txBody>
       </p:sp>
+      <p:graphicFrame>
+        <p:nvGraphicFramePr>
+          <p:cNvPr id="4" name="Table 3"/>
+          <p:cNvGraphicFramePr>
+            <a:graphicFrameLocks noGrp="1"/>
+          </p:cNvGraphicFramePr>
+          <p:nvPr/>
+        </p:nvGraphicFramePr>
+        <p:xfrm>
+          <a:off x="5943600" y="1280160"/>
+          <a:ext cx="5486400" cy="3200400"/>
+        </p:xfrm>
+        <a:graphic>
+          <a:graphicData uri="http://schemas.openxmlformats.org/drawingml/2006/table">
+            <a:tbl>
+              <a:tblPr firstRow="1" bandRow="1">
+                <a:tableStyleId>{5C22544A-7EE6-4342-B048-85BDC9FD1C3A}</a:tableStyleId>
+              </a:tblPr>
+              <a:tblGrid>
+                <a:gridCol w="1371600"/>
+                <a:gridCol w="1371600"/>
+                <a:gridCol w="1371600"/>
+                <a:gridCol w="1371600"/>
+              </a:tblGrid>
+              <a:tr h="533400">
+                <a:tc>
+                  <a:txBody>
+                    <a:bodyPr/>
+                    <a:lstStyle/>
+                    <a:p>
+                      <a:r>
+                        <a:rPr sz="1600" b="1">
+                          <a:solidFill>
+                            <a:srgbClr val="225588"/>
+                          </a:solidFill>
+                          <a:latin typeface="Calibri Light"/>
+                        </a:rPr>
+                        <a:t>Feature</a:t>
+                      </a:r>
+                    </a:p>
+                  </a:txBody>
+                  <a:tcPr/>
+                </a:tc>
+                <a:tc>
+                  <a:txBody>
+                    <a:bodyPr/>
+                    <a:lstStyle/>
+                    <a:p>
+                      <a:r>
+                        <a:rPr sz="1600" b="1">
+                          <a:solidFill>
+                            <a:srgbClr val="225588"/>
+                          </a:solidFill>
+                          <a:latin typeface="Calibri Light"/>
+                        </a:rPr>
+                        <a:t>Our Model</a:t>
+                      </a:r>
+                    </a:p>
+                  </a:txBody>
+                  <a:tcPr/>
+                </a:tc>
+                <a:tc>
+                  <a:txBody>
+                    <a:bodyPr/>
+                    <a:lstStyle/>
+                    <a:p>
+                      <a:r>
+                        <a:rPr sz="1600" b="1">
+                          <a:solidFill>
+                            <a:srgbClr val="225588"/>
+                          </a:solidFill>
+                          <a:latin typeface="Calibri Light"/>
+                        </a:rPr>
+                        <a:t>PlaNet</a:t>
+                      </a:r>
+                    </a:p>
+                  </a:txBody>
+                  <a:tcPr/>
+                </a:tc>
+                <a:tc>
+                  <a:txBody>
+                    <a:bodyPr/>
+                    <a:lstStyle/>
+                    <a:p>
+                      <a:r>
+                        <a:rPr sz="1600" b="1">
+                          <a:solidFill>
+                            <a:srgbClr val="225588"/>
+                          </a:solidFill>
+                          <a:latin typeface="Calibri Light"/>
+                        </a:rPr>
+                        <a:t>RWM</a:t>
+                      </a:r>
+                    </a:p>
+                  </a:txBody>
+                  <a:tcPr/>
+                </a:tc>
+              </a:tr>
+              <a:tr h="533400">
+                <a:tc>
+                  <a:txBody>
+                    <a:bodyPr/>
+                    <a:lstStyle/>
+                    <a:p>
+                      <a:r>
+                        <a:rPr sz="1400">
+                          <a:latin typeface="Calibri"/>
+                        </a:rPr>
+                        <a:t>Modalities</a:t>
+                      </a:r>
+                    </a:p>
+                  </a:txBody>
+                  <a:tcPr/>
+                </a:tc>
+                <a:tc>
+                  <a:txBody>
+                    <a:bodyPr/>
+                    <a:lstStyle/>
+                    <a:p>
+                      <a:r>
+                        <a:rPr sz="1400">
+                          <a:latin typeface="Calibri"/>
+                        </a:rPr>
+                        <a:t>Visual, proprio, reward, actions</a:t>
+                      </a:r>
+                    </a:p>
+                  </a:txBody>
+                  <a:tcPr/>
+                </a:tc>
+                <a:tc>
+                  <a:txBody>
+                    <a:bodyPr/>
+                    <a:lstStyle/>
+                    <a:p>
+                      <a:r>
+                        <a:rPr sz="1400">
+                          <a:latin typeface="Calibri"/>
+                        </a:rPr>
+                        <a:t>Visual only</a:t>
+                      </a:r>
+                    </a:p>
+                  </a:txBody>
+                  <a:tcPr/>
+                </a:tc>
+                <a:tc>
+                  <a:txBody>
+                    <a:bodyPr/>
+                    <a:lstStyle/>
+                    <a:p>
+                      <a:r>
+                        <a:rPr sz="1400">
+                          <a:latin typeface="Calibri"/>
+                        </a:rPr>
+                        <a:t>Visual, action</a:t>
+                      </a:r>
+                    </a:p>
+                  </a:txBody>
+                  <a:tcPr/>
+                </a:tc>
+              </a:tr>
+              <a:tr h="533400">
+                <a:tc>
+                  <a:txBody>
+                    <a:bodyPr/>
+                    <a:lstStyle/>
+                    <a:p>
+                      <a:r>
+                        <a:rPr sz="1400">
+                          <a:latin typeface="Calibri"/>
+                        </a:rPr>
+                        <a:t>Hierarchy</a:t>
+                      </a:r>
+                    </a:p>
+                  </a:txBody>
+                  <a:tcPr/>
+                </a:tc>
+                <a:tc>
+                  <a:txBody>
+                    <a:bodyPr/>
+                    <a:lstStyle/>
+                    <a:p>
+                      <a:r>
+                        <a:rPr sz="1400">
+                          <a:latin typeface="Calibri"/>
+                        </a:rPr>
+                        <a:t>3-tier HVAE</a:t>
+                      </a:r>
+                    </a:p>
+                  </a:txBody>
+                  <a:tcPr/>
+                </a:tc>
+                <a:tc>
+                  <a:txBody>
+                    <a:bodyPr/>
+                    <a:lstStyle/>
+                    <a:p>
+                      <a:r>
+                        <a:rPr sz="1400">
+                          <a:latin typeface="Calibri"/>
+                        </a:rPr>
+                        <a:t>None (flat)</a:t>
+                      </a:r>
+                    </a:p>
+                  </a:txBody>
+                  <a:tcPr/>
+                </a:tc>
+                <a:tc>
+                  <a:txBody>
+                    <a:bodyPr/>
+                    <a:lstStyle/>
+                    <a:p>
+                      <a:r>
+                        <a:rPr sz="1400">
+                          <a:latin typeface="Calibri"/>
+                        </a:rPr>
+                        <a:t>2-layer nets</a:t>
+                      </a:r>
+                    </a:p>
+                  </a:txBody>
+                  <a:tcPr/>
+                </a:tc>
+              </a:tr>
+              <a:tr h="533400">
+                <a:tc>
+                  <a:txBody>
+                    <a:bodyPr/>
+                    <a:lstStyle/>
+                    <a:p>
+                      <a:r>
+                        <a:rPr sz="1400">
+                          <a:latin typeface="Calibri"/>
+                        </a:rPr>
+                        <a:t>Fusion</a:t>
+                      </a:r>
+                    </a:p>
+                  </a:txBody>
+                  <a:tcPr/>
+                </a:tc>
+                <a:tc>
+                  <a:txBody>
+                    <a:bodyPr/>
+                    <a:lstStyle/>
+                    <a:p>
+                      <a:r>
+                        <a:rPr sz="1400">
+                          <a:latin typeface="Calibri"/>
+                        </a:rPr>
+                        <a:t>Cross-attention + dropout</a:t>
+                      </a:r>
+                    </a:p>
+                  </a:txBody>
+                  <a:tcPr/>
+                </a:tc>
+                <a:tc>
+                  <a:txBody>
+                    <a:bodyPr/>
+                    <a:lstStyle/>
+                    <a:p>
+                      <a:r>
+                        <a:rPr sz="1400">
+                          <a:latin typeface="Calibri"/>
+                        </a:rPr>
+                        <a:t>Concat/shared</a:t>
+                      </a:r>
+                    </a:p>
+                  </a:txBody>
+                  <a:tcPr/>
+                </a:tc>
+                <a:tc>
+                  <a:txBody>
+                    <a:bodyPr/>
+                    <a:lstStyle/>
+                    <a:p>
+                      <a:r>
+                        <a:rPr sz="1400">
+                          <a:latin typeface="Calibri"/>
+                        </a:rPr>
+                        <a:t>Concat + LSTM</a:t>
+                      </a:r>
+                    </a:p>
+                  </a:txBody>
+                  <a:tcPr/>
+                </a:tc>
+              </a:tr>
+              <a:tr h="533400">
+                <a:tc>
+                  <a:txBody>
+                    <a:bodyPr/>
+                    <a:lstStyle/>
+                    <a:p>
+                      <a:r>
+                        <a:rPr sz="1400">
+                          <a:latin typeface="Calibri"/>
+                        </a:rPr>
+                        <a:t>Counterfactuals</a:t>
+                      </a:r>
+                    </a:p>
+                  </a:txBody>
+                  <a:tcPr/>
+                </a:tc>
+                <a:tc>
+                  <a:txBody>
+                    <a:bodyPr/>
+                    <a:lstStyle/>
+                    <a:p>
+                      <a:r>
+                        <a:rPr sz="1400">
+                          <a:latin typeface="Calibri"/>
+                        </a:rPr>
+                        <a:t>Latent trajectory editing</a:t>
+                      </a:r>
+                    </a:p>
+                  </a:txBody>
+                  <a:tcPr/>
+                </a:tc>
+                <a:tc>
+                  <a:txBody>
+                    <a:bodyPr/>
+                    <a:lstStyle/>
+                    <a:p>
+                      <a:r>
+                        <a:rPr sz="1400">
+                          <a:latin typeface="Calibri"/>
+                        </a:rPr>
+                        <a:t>Rollouts only</a:t>
+                      </a:r>
+                    </a:p>
+                  </a:txBody>
+                  <a:tcPr/>
+                </a:tc>
+                <a:tc>
+                  <a:txBody>
+                    <a:bodyPr/>
+                    <a:lstStyle/>
+                    <a:p>
+                      <a:r>
+                        <a:rPr sz="1400">
+                          <a:latin typeface="Calibri"/>
+                        </a:rPr>
+                        <a:t>Limited imagination</a:t>
+                      </a:r>
+                    </a:p>
+                  </a:txBody>
+                  <a:tcPr/>
+                </a:tc>
+              </a:tr>
+              <a:tr h="533400">
+                <a:tc>
+                  <a:txBody>
+                    <a:bodyPr/>
+                    <a:lstStyle/>
+                    <a:p>
+                      <a:r>
+                        <a:rPr sz="1400">
+                          <a:latin typeface="Calibri"/>
+                        </a:rPr>
+                        <a:t>Affect</a:t>
+                      </a:r>
+                    </a:p>
+                  </a:txBody>
+                  <a:tcPr/>
+                </a:tc>
+                <a:tc>
+                  <a:txBody>
+                    <a:bodyPr/>
+                    <a:lstStyle/>
+                    <a:p>
+                      <a:r>
+                        <a:rPr sz="1400">
+                          <a:latin typeface="Calibri"/>
+                        </a:rPr>
+                        <a:t>Reward valence encoding</a:t>
+                      </a:r>
+                    </a:p>
+                  </a:txBody>
+                  <a:tcPr/>
+                </a:tc>
+                <a:tc>
+                  <a:txBody>
+                    <a:bodyPr/>
+                    <a:lstStyle/>
+                    <a:p>
+                      <a:r>
+                        <a:rPr sz="1400">
+                          <a:latin typeface="Calibri"/>
+                        </a:rPr>
+                        <a:t>Scalar reward</a:t>
+                      </a:r>
+                    </a:p>
+                  </a:txBody>
+                  <a:tcPr/>
+                </a:tc>
+                <a:tc>
+                  <a:txBody>
+                    <a:bodyPr/>
+                    <a:lstStyle/>
+                    <a:p>
+                      <a:r>
+                        <a:rPr sz="1400">
+                          <a:latin typeface="Calibri"/>
+                        </a:rPr>
+                        <a:t>Scalar reward</a:t>
+                      </a:r>
+                    </a:p>
+                  </a:txBody>
+                  <a:tcPr/>
+                </a:tc>
+              </a:tr>
+            </a:tbl>
+          </a:graphicData>
+        </a:graphic>
+      </p:graphicFrame>
     </p:spTree>
   </p:cSld>
   <p:clrMapOvr>
@@ -5978,7 +6836,7 @@
             <a:off x="2377440" y="2286000"/>
             <a:ext cx="457200" cy="0"/>
           </a:xfrm>
-          <a:prstGeom prst="bentConnector3">
+          <a:prstGeom prst="line">
             <a:avLst/>
           </a:prstGeom>
         </p:spPr>
@@ -6008,7 +6866,7 @@
             <a:off x="4754880" y="2286000"/>
             <a:ext cx="457200" cy="0"/>
           </a:xfrm>
-          <a:prstGeom prst="bentConnector3">
+          <a:prstGeom prst="line">
             <a:avLst/>
           </a:prstGeom>
         </p:spPr>
@@ -6038,7 +6896,7 @@
             <a:off x="7132320" y="2286000"/>
             <a:ext cx="457200" cy="0"/>
           </a:xfrm>
-          <a:prstGeom prst="bentConnector3">
+          <a:prstGeom prst="line">
             <a:avLst/>
           </a:prstGeom>
         </p:spPr>
@@ -6068,7 +6926,7 @@
             <a:off x="9509760" y="2286000"/>
             <a:ext cx="457200" cy="0"/>
           </a:xfrm>
-          <a:prstGeom prst="bentConnector3">
+          <a:prstGeom prst="line">
             <a:avLst/>
           </a:prstGeom>
         </p:spPr>
@@ -6176,6 +7034,350 @@
           </a:p>
         </p:txBody>
       </p:sp>
+      <p:sp>
+        <p:nvSpPr>
+          <p:cNvPr id="4" name="Rectangle 3"/>
+          <p:cNvSpPr/>
+          <p:nvPr/>
+        </p:nvSpPr>
+        <p:spPr>
+          <a:xfrm>
+            <a:off x="5943600" y="1280160"/>
+            <a:ext cx="1645920" cy="731520"/>
+          </a:xfrm>
+          <a:prstGeom prst="rect">
+            <a:avLst/>
+          </a:prstGeom>
+        </p:spPr>
+        <p:style>
+          <a:lnRef idx="1">
+            <a:schemeClr val="accent1"/>
+          </a:lnRef>
+          <a:fillRef idx="3">
+            <a:schemeClr val="accent1"/>
+          </a:fillRef>
+          <a:effectRef idx="2">
+            <a:schemeClr val="accent1"/>
+          </a:effectRef>
+          <a:fontRef idx="minor">
+            <a:schemeClr val="lt1"/>
+          </a:fontRef>
+        </p:style>
+        <p:txBody>
+          <a:bodyPr rtlCol="0" anchor="ctr" lIns="0" rIns="0"/>
+          <a:lstStyle/>
+          <a:p>
+            <a:pPr algn="ctr"/>
+            <a:r>
+              <a:rPr sz="2000">
+                <a:latin typeface="Calibri"/>
+              </a:rPr>
+              <a:t>Visual</a:t>
+            </a:r>
+          </a:p>
+        </p:txBody>
+      </p:sp>
+      <p:sp>
+        <p:nvSpPr>
+          <p:cNvPr id="5" name="Rectangle 4"/>
+          <p:cNvSpPr/>
+          <p:nvPr/>
+        </p:nvSpPr>
+        <p:spPr>
+          <a:xfrm>
+            <a:off x="5943600" y="2194560"/>
+            <a:ext cx="1645920" cy="731520"/>
+          </a:xfrm>
+          <a:prstGeom prst="rect">
+            <a:avLst/>
+          </a:prstGeom>
+        </p:spPr>
+        <p:style>
+          <a:lnRef idx="1">
+            <a:schemeClr val="accent1"/>
+          </a:lnRef>
+          <a:fillRef idx="3">
+            <a:schemeClr val="accent1"/>
+          </a:fillRef>
+          <a:effectRef idx="2">
+            <a:schemeClr val="accent1"/>
+          </a:effectRef>
+          <a:fontRef idx="minor">
+            <a:schemeClr val="lt1"/>
+          </a:fontRef>
+        </p:style>
+        <p:txBody>
+          <a:bodyPr rtlCol="0" anchor="ctr" lIns="0" rIns="0"/>
+          <a:lstStyle/>
+          <a:p>
+            <a:pPr algn="ctr"/>
+            <a:r>
+              <a:rPr sz="2000">
+                <a:latin typeface="Calibri"/>
+              </a:rPr>
+              <a:t>Proprio</a:t>
+            </a:r>
+          </a:p>
+        </p:txBody>
+      </p:sp>
+      <p:sp>
+        <p:nvSpPr>
+          <p:cNvPr id="6" name="Rectangle 5"/>
+          <p:cNvSpPr/>
+          <p:nvPr/>
+        </p:nvSpPr>
+        <p:spPr>
+          <a:xfrm>
+            <a:off x="5943600" y="3108960"/>
+            <a:ext cx="1645920" cy="731520"/>
+          </a:xfrm>
+          <a:prstGeom prst="rect">
+            <a:avLst/>
+          </a:prstGeom>
+        </p:spPr>
+        <p:style>
+          <a:lnRef idx="1">
+            <a:schemeClr val="accent1"/>
+          </a:lnRef>
+          <a:fillRef idx="3">
+            <a:schemeClr val="accent1"/>
+          </a:fillRef>
+          <a:effectRef idx="2">
+            <a:schemeClr val="accent1"/>
+          </a:effectRef>
+          <a:fontRef idx="minor">
+            <a:schemeClr val="lt1"/>
+          </a:fontRef>
+        </p:style>
+        <p:txBody>
+          <a:bodyPr rtlCol="0" anchor="ctr" lIns="0" rIns="0"/>
+          <a:lstStyle/>
+          <a:p>
+            <a:pPr algn="ctr"/>
+            <a:r>
+              <a:rPr sz="2000">
+                <a:latin typeface="Calibri"/>
+              </a:rPr>
+              <a:t>Action</a:t>
+            </a:r>
+          </a:p>
+        </p:txBody>
+      </p:sp>
+      <p:sp>
+        <p:nvSpPr>
+          <p:cNvPr id="7" name="Rectangle 6"/>
+          <p:cNvSpPr/>
+          <p:nvPr/>
+        </p:nvSpPr>
+        <p:spPr>
+          <a:xfrm>
+            <a:off x="5943600" y="4023360"/>
+            <a:ext cx="1645920" cy="731520"/>
+          </a:xfrm>
+          <a:prstGeom prst="rect">
+            <a:avLst/>
+          </a:prstGeom>
+        </p:spPr>
+        <p:style>
+          <a:lnRef idx="1">
+            <a:schemeClr val="accent1"/>
+          </a:lnRef>
+          <a:fillRef idx="3">
+            <a:schemeClr val="accent1"/>
+          </a:fillRef>
+          <a:effectRef idx="2">
+            <a:schemeClr val="accent1"/>
+          </a:effectRef>
+          <a:fontRef idx="minor">
+            <a:schemeClr val="lt1"/>
+          </a:fontRef>
+        </p:style>
+        <p:txBody>
+          <a:bodyPr rtlCol="0" anchor="ctr" lIns="0" rIns="0"/>
+          <a:lstStyle/>
+          <a:p>
+            <a:pPr algn="ctr"/>
+            <a:r>
+              <a:rPr sz="2000">
+                <a:latin typeface="Calibri"/>
+              </a:rPr>
+              <a:t>Reward</a:t>
+            </a:r>
+          </a:p>
+        </p:txBody>
+      </p:sp>
+      <p:sp>
+        <p:nvSpPr>
+          <p:cNvPr id="8" name="Rectangle 7"/>
+          <p:cNvSpPr/>
+          <p:nvPr/>
+        </p:nvSpPr>
+        <p:spPr>
+          <a:xfrm>
+            <a:off x="8138160" y="2194560"/>
+            <a:ext cx="2011680" cy="1463040"/>
+          </a:xfrm>
+          <a:prstGeom prst="rect">
+            <a:avLst/>
+          </a:prstGeom>
+        </p:spPr>
+        <p:style>
+          <a:lnRef idx="1">
+            <a:schemeClr val="accent1"/>
+          </a:lnRef>
+          <a:fillRef idx="3">
+            <a:schemeClr val="accent1"/>
+          </a:fillRef>
+          <a:effectRef idx="2">
+            <a:schemeClr val="accent1"/>
+          </a:effectRef>
+          <a:fontRef idx="minor">
+            <a:schemeClr val="lt1"/>
+          </a:fontRef>
+        </p:style>
+        <p:txBody>
+          <a:bodyPr rtlCol="0" anchor="ctr" lIns="0" rIns="0"/>
+          <a:lstStyle/>
+          <a:p>
+            <a:pPr algn="ctr"/>
+            <a:r>
+              <a:rPr sz="2000">
+                <a:latin typeface="Calibri"/>
+              </a:rPr>
+              <a:t>Cross-Attn</a:t>
+            </a:r>
+          </a:p>
+          <a:p>
+            <a:pPr algn="ctr"/>
+            <a:r>
+              <a:rPr sz="2000">
+                <a:latin typeface="Calibri"/>
+              </a:rPr>
+              <a:t>Fusion</a:t>
+            </a:r>
+          </a:p>
+        </p:txBody>
+      </p:sp>
+      <p:cxnSp>
+        <p:nvCxnSpPr>
+          <p:cNvPr id="9" name="Connector 8"/>
+          <p:cNvCxnSpPr/>
+          <p:nvPr/>
+        </p:nvCxnSpPr>
+        <p:spPr>
+          <a:xfrm>
+            <a:off x="7589520" y="1645919"/>
+            <a:ext cx="548640" cy="1280161"/>
+          </a:xfrm>
+          <a:prstGeom prst="line">
+            <a:avLst/>
+          </a:prstGeom>
+        </p:spPr>
+        <p:style>
+          <a:lnRef idx="2">
+            <a:schemeClr val="accent1"/>
+          </a:lnRef>
+          <a:fillRef idx="0">
+            <a:schemeClr val="accent1"/>
+          </a:fillRef>
+          <a:effectRef idx="1">
+            <a:schemeClr val="accent1"/>
+          </a:effectRef>
+          <a:fontRef idx="minor">
+            <a:schemeClr val="tx1"/>
+          </a:fontRef>
+        </p:style>
+      </p:cxnSp>
+      <p:cxnSp>
+        <p:nvCxnSpPr>
+          <p:cNvPr id="10" name="Connector 9"/>
+          <p:cNvCxnSpPr/>
+          <p:nvPr/>
+        </p:nvCxnSpPr>
+        <p:spPr>
+          <a:xfrm>
+            <a:off x="7589520" y="2560320"/>
+            <a:ext cx="548640" cy="365760"/>
+          </a:xfrm>
+          <a:prstGeom prst="line">
+            <a:avLst/>
+          </a:prstGeom>
+        </p:spPr>
+        <p:style>
+          <a:lnRef idx="2">
+            <a:schemeClr val="accent1"/>
+          </a:lnRef>
+          <a:fillRef idx="0">
+            <a:schemeClr val="accent1"/>
+          </a:fillRef>
+          <a:effectRef idx="1">
+            <a:schemeClr val="accent1"/>
+          </a:effectRef>
+          <a:fontRef idx="minor">
+            <a:schemeClr val="tx1"/>
+          </a:fontRef>
+        </p:style>
+      </p:cxnSp>
+      <p:cxnSp>
+        <p:nvCxnSpPr>
+          <p:cNvPr id="11" name="Connector 10"/>
+          <p:cNvCxnSpPr/>
+          <p:nvPr/>
+        </p:nvCxnSpPr>
+        <p:spPr>
+          <a:xfrm flipV="1">
+            <a:off x="7589520" y="2926080"/>
+            <a:ext cx="548640" cy="548640"/>
+          </a:xfrm>
+          <a:prstGeom prst="line">
+            <a:avLst/>
+          </a:prstGeom>
+        </p:spPr>
+        <p:style>
+          <a:lnRef idx="2">
+            <a:schemeClr val="accent1"/>
+          </a:lnRef>
+          <a:fillRef idx="0">
+            <a:schemeClr val="accent1"/>
+          </a:fillRef>
+          <a:effectRef idx="1">
+            <a:schemeClr val="accent1"/>
+          </a:effectRef>
+          <a:fontRef idx="minor">
+            <a:schemeClr val="tx1"/>
+          </a:fontRef>
+        </p:style>
+      </p:cxnSp>
+      <p:cxnSp>
+        <p:nvCxnSpPr>
+          <p:cNvPr id="12" name="Connector 11"/>
+          <p:cNvCxnSpPr/>
+          <p:nvPr/>
+        </p:nvCxnSpPr>
+        <p:spPr>
+          <a:xfrm flipV="1">
+            <a:off x="7589520" y="2926080"/>
+            <a:ext cx="548640" cy="1463040"/>
+          </a:xfrm>
+          <a:prstGeom prst="line">
+            <a:avLst/>
+          </a:prstGeom>
+        </p:spPr>
+        <p:style>
+          <a:lnRef idx="2">
+            <a:schemeClr val="accent1"/>
+          </a:lnRef>
+          <a:fillRef idx="0">
+            <a:schemeClr val="accent1"/>
+          </a:fillRef>
+          <a:effectRef idx="1">
+            <a:schemeClr val="accent1"/>
+          </a:effectRef>
+          <a:fontRef idx="minor">
+            <a:schemeClr val="tx1"/>
+          </a:fontRef>
+        </p:style>
+      </p:cxnSp>
     </p:spTree>
   </p:cSld>
   <p:clrMapOvr>
@@ -6265,6 +7467,218 @@
           </a:p>
         </p:txBody>
       </p:sp>
+      <p:sp>
+        <p:nvSpPr>
+          <p:cNvPr id="4" name="Rectangle 3"/>
+          <p:cNvSpPr/>
+          <p:nvPr/>
+        </p:nvSpPr>
+        <p:spPr>
+          <a:xfrm>
+            <a:off x="5943600" y="1463040"/>
+            <a:ext cx="1371600" cy="457200"/>
+          </a:xfrm>
+          <a:prstGeom prst="rect">
+            <a:avLst/>
+          </a:prstGeom>
+          <a:solidFill>
+            <a:srgbClr val="225588"/>
+          </a:solidFill>
+          <a:ln>
+            <a:solidFill>
+              <a:srgbClr val="FFFFFF"/>
+            </a:solidFill>
+          </a:ln>
+        </p:spPr>
+        <p:style>
+          <a:lnRef idx="1">
+            <a:schemeClr val="accent1"/>
+          </a:lnRef>
+          <a:fillRef idx="3">
+            <a:schemeClr val="accent1"/>
+          </a:fillRef>
+          <a:effectRef idx="2">
+            <a:schemeClr val="accent1"/>
+          </a:effectRef>
+          <a:fontRef idx="minor">
+            <a:schemeClr val="lt1"/>
+          </a:fontRef>
+        </p:style>
+        <p:txBody>
+          <a:bodyPr rtlCol="0" anchor="ctr"/>
+          <a:lstStyle/>
+          <a:p>
+            <a:pPr algn="ctr"/>
+          </a:p>
+        </p:txBody>
+      </p:sp>
+      <p:sp>
+        <p:nvSpPr>
+          <p:cNvPr id="5" name="Rectangle 4"/>
+          <p:cNvSpPr/>
+          <p:nvPr/>
+        </p:nvSpPr>
+        <p:spPr>
+          <a:xfrm>
+            <a:off x="7315200" y="1463040"/>
+            <a:ext cx="1920239" cy="457200"/>
+          </a:xfrm>
+          <a:prstGeom prst="rect">
+            <a:avLst/>
+          </a:prstGeom>
+          <a:solidFill>
+            <a:srgbClr val="AA7733"/>
+          </a:solidFill>
+          <a:ln>
+            <a:solidFill>
+              <a:srgbClr val="FFFFFF"/>
+            </a:solidFill>
+          </a:ln>
+        </p:spPr>
+        <p:style>
+          <a:lnRef idx="1">
+            <a:schemeClr val="accent1"/>
+          </a:lnRef>
+          <a:fillRef idx="3">
+            <a:schemeClr val="accent1"/>
+          </a:fillRef>
+          <a:effectRef idx="2">
+            <a:schemeClr val="accent1"/>
+          </a:effectRef>
+          <a:fontRef idx="minor">
+            <a:schemeClr val="lt1"/>
+          </a:fontRef>
+        </p:style>
+        <p:txBody>
+          <a:bodyPr rtlCol="0" anchor="ctr"/>
+          <a:lstStyle/>
+          <a:p>
+            <a:pPr algn="ctr"/>
+          </a:p>
+        </p:txBody>
+      </p:sp>
+      <p:sp>
+        <p:nvSpPr>
+          <p:cNvPr id="6" name="Rectangle 5"/>
+          <p:cNvSpPr/>
+          <p:nvPr/>
+        </p:nvSpPr>
+        <p:spPr>
+          <a:xfrm>
+            <a:off x="9235440" y="1463040"/>
+            <a:ext cx="1097280" cy="457200"/>
+          </a:xfrm>
+          <a:prstGeom prst="rect">
+            <a:avLst/>
+          </a:prstGeom>
+          <a:solidFill>
+            <a:srgbClr val="3A9D23"/>
+          </a:solidFill>
+          <a:ln>
+            <a:solidFill>
+              <a:srgbClr val="FFFFFF"/>
+            </a:solidFill>
+          </a:ln>
+        </p:spPr>
+        <p:style>
+          <a:lnRef idx="1">
+            <a:schemeClr val="accent1"/>
+          </a:lnRef>
+          <a:fillRef idx="3">
+            <a:schemeClr val="accent1"/>
+          </a:fillRef>
+          <a:effectRef idx="2">
+            <a:schemeClr val="accent1"/>
+          </a:effectRef>
+          <a:fontRef idx="minor">
+            <a:schemeClr val="lt1"/>
+          </a:fontRef>
+        </p:style>
+        <p:txBody>
+          <a:bodyPr rtlCol="0" anchor="ctr"/>
+          <a:lstStyle/>
+          <a:p>
+            <a:pPr algn="ctr"/>
+          </a:p>
+        </p:txBody>
+      </p:sp>
+      <p:sp>
+        <p:nvSpPr>
+          <p:cNvPr id="7" name="Rectangle 6"/>
+          <p:cNvSpPr/>
+          <p:nvPr/>
+        </p:nvSpPr>
+        <p:spPr>
+          <a:xfrm>
+            <a:off x="10332720" y="1463040"/>
+            <a:ext cx="1097280" cy="457200"/>
+          </a:xfrm>
+          <a:prstGeom prst="rect">
+            <a:avLst/>
+          </a:prstGeom>
+          <a:solidFill>
+            <a:srgbClr val="888888"/>
+          </a:solidFill>
+          <a:ln>
+            <a:solidFill>
+              <a:srgbClr val="FFFFFF"/>
+            </a:solidFill>
+          </a:ln>
+        </p:spPr>
+        <p:style>
+          <a:lnRef idx="1">
+            <a:schemeClr val="accent1"/>
+          </a:lnRef>
+          <a:fillRef idx="3">
+            <a:schemeClr val="accent1"/>
+          </a:fillRef>
+          <a:effectRef idx="2">
+            <a:schemeClr val="accent1"/>
+          </a:effectRef>
+          <a:fontRef idx="minor">
+            <a:schemeClr val="lt1"/>
+          </a:fontRef>
+        </p:style>
+        <p:txBody>
+          <a:bodyPr rtlCol="0" anchor="ctr"/>
+          <a:lstStyle/>
+          <a:p>
+            <a:pPr algn="ctr"/>
+          </a:p>
+        </p:txBody>
+      </p:sp>
+      <p:sp>
+        <p:nvSpPr>
+          <p:cNvPr id="8" name="TextBox 7"/>
+          <p:cNvSpPr txBox="1"/>
+          <p:nvPr/>
+        </p:nvSpPr>
+        <p:spPr>
+          <a:xfrm>
+            <a:off x="5943600" y="2011680"/>
+            <a:ext cx="5486400" cy="548640"/>
+          </a:xfrm>
+          <a:prstGeom prst="rect">
+            <a:avLst/>
+          </a:prstGeom>
+          <a:noFill/>
+        </p:spPr>
+        <p:txBody>
+          <a:bodyPr wrap="none">
+            <a:spAutoFit/>
+          </a:bodyPr>
+          <a:lstStyle/>
+          <a:p>
+            <a:pPr algn="l"/>
+            <a:r>
+              <a:rPr sz="1400">
+                <a:latin typeface="Calibri"/>
+              </a:rPr>
+              <a:t>Episode segmentation (phases)</a:t>
+            </a:r>
+          </a:p>
+        </p:txBody>
+      </p:sp>
     </p:spTree>
   </p:cSld>
   <p:clrMapOvr>
@@ -6350,6 +7764,195 @@
                 <a:latin typeface="Calibri"/>
               </a:rPr>
               <a:t>Drill-down/roll-up consistency checks</a:t>
+            </a:r>
+          </a:p>
+        </p:txBody>
+      </p:sp>
+      <p:sp>
+        <p:nvSpPr>
+          <p:cNvPr id="4" name="Rectangle 3"/>
+          <p:cNvSpPr/>
+          <p:nvPr/>
+        </p:nvSpPr>
+        <p:spPr>
+          <a:xfrm>
+            <a:off x="5943600" y="1280160"/>
+            <a:ext cx="2011680" cy="731520"/>
+          </a:xfrm>
+          <a:prstGeom prst="rect">
+            <a:avLst/>
+          </a:prstGeom>
+        </p:spPr>
+        <p:style>
+          <a:lnRef idx="1">
+            <a:schemeClr val="accent1"/>
+          </a:lnRef>
+          <a:fillRef idx="3">
+            <a:schemeClr val="accent1"/>
+          </a:fillRef>
+          <a:effectRef idx="2">
+            <a:schemeClr val="accent1"/>
+          </a:effectRef>
+          <a:fontRef idx="minor">
+            <a:schemeClr val="lt1"/>
+          </a:fontRef>
+        </p:style>
+        <p:txBody>
+          <a:bodyPr rtlCol="0" anchor="ctr" lIns="0" rIns="0"/>
+          <a:lstStyle/>
+          <a:p>
+            <a:pPr algn="ctr"/>
+            <a:r>
+              <a:rPr sz="2000">
+                <a:latin typeface="Calibri"/>
+              </a:rPr>
+              <a:t>z3: Conceptual</a:t>
+            </a:r>
+          </a:p>
+        </p:txBody>
+      </p:sp>
+      <p:cxnSp>
+        <p:nvCxnSpPr>
+          <p:cNvPr id="5" name="Connector 4"/>
+          <p:cNvCxnSpPr/>
+          <p:nvPr/>
+        </p:nvCxnSpPr>
+        <p:spPr>
+          <a:xfrm>
+            <a:off x="6949440" y="2011680"/>
+            <a:ext cx="0" cy="274320"/>
+          </a:xfrm>
+          <a:prstGeom prst="line">
+            <a:avLst/>
+          </a:prstGeom>
+        </p:spPr>
+        <p:style>
+          <a:lnRef idx="2">
+            <a:schemeClr val="accent1"/>
+          </a:lnRef>
+          <a:fillRef idx="0">
+            <a:schemeClr val="accent1"/>
+          </a:fillRef>
+          <a:effectRef idx="1">
+            <a:schemeClr val="accent1"/>
+          </a:effectRef>
+          <a:fontRef idx="minor">
+            <a:schemeClr val="tx1"/>
+          </a:fontRef>
+        </p:style>
+      </p:cxnSp>
+      <p:sp>
+        <p:nvSpPr>
+          <p:cNvPr id="6" name="Rectangle 5"/>
+          <p:cNvSpPr/>
+          <p:nvPr/>
+        </p:nvSpPr>
+        <p:spPr>
+          <a:xfrm>
+            <a:off x="5943600" y="2286000"/>
+            <a:ext cx="2011680" cy="731520"/>
+          </a:xfrm>
+          <a:prstGeom prst="rect">
+            <a:avLst/>
+          </a:prstGeom>
+        </p:spPr>
+        <p:style>
+          <a:lnRef idx="1">
+            <a:schemeClr val="accent1"/>
+          </a:lnRef>
+          <a:fillRef idx="3">
+            <a:schemeClr val="accent1"/>
+          </a:fillRef>
+          <a:effectRef idx="2">
+            <a:schemeClr val="accent1"/>
+          </a:effectRef>
+          <a:fontRef idx="minor">
+            <a:schemeClr val="lt1"/>
+          </a:fontRef>
+        </p:style>
+        <p:txBody>
+          <a:bodyPr rtlCol="0" anchor="ctr" lIns="0" rIns="0"/>
+          <a:lstStyle/>
+          <a:p>
+            <a:pPr algn="ctr"/>
+            <a:r>
+              <a:rPr sz="2000">
+                <a:latin typeface="Calibri"/>
+              </a:rPr>
+              <a:t>z2: Segments</a:t>
+            </a:r>
+          </a:p>
+        </p:txBody>
+      </p:sp>
+      <p:cxnSp>
+        <p:nvCxnSpPr>
+          <p:cNvPr id="7" name="Connector 6"/>
+          <p:cNvCxnSpPr/>
+          <p:nvPr/>
+        </p:nvCxnSpPr>
+        <p:spPr>
+          <a:xfrm>
+            <a:off x="6949440" y="3017520"/>
+            <a:ext cx="0" cy="274319"/>
+          </a:xfrm>
+          <a:prstGeom prst="line">
+            <a:avLst/>
+          </a:prstGeom>
+        </p:spPr>
+        <p:style>
+          <a:lnRef idx="2">
+            <a:schemeClr val="accent1"/>
+          </a:lnRef>
+          <a:fillRef idx="0">
+            <a:schemeClr val="accent1"/>
+          </a:fillRef>
+          <a:effectRef idx="1">
+            <a:schemeClr val="accent1"/>
+          </a:effectRef>
+          <a:fontRef idx="minor">
+            <a:schemeClr val="tx1"/>
+          </a:fontRef>
+        </p:style>
+      </p:cxnSp>
+      <p:sp>
+        <p:nvSpPr>
+          <p:cNvPr id="8" name="Rectangle 7"/>
+          <p:cNvSpPr/>
+          <p:nvPr/>
+        </p:nvSpPr>
+        <p:spPr>
+          <a:xfrm>
+            <a:off x="5943600" y="3291840"/>
+            <a:ext cx="2011680" cy="731520"/>
+          </a:xfrm>
+          <a:prstGeom prst="rect">
+            <a:avLst/>
+          </a:prstGeom>
+        </p:spPr>
+        <p:style>
+          <a:lnRef idx="1">
+            <a:schemeClr val="accent1"/>
+          </a:lnRef>
+          <a:fillRef idx="3">
+            <a:schemeClr val="accent1"/>
+          </a:fillRef>
+          <a:effectRef idx="2">
+            <a:schemeClr val="accent1"/>
+          </a:effectRef>
+          <a:fontRef idx="minor">
+            <a:schemeClr val="lt1"/>
+          </a:fontRef>
+        </p:style>
+        <p:txBody>
+          <a:bodyPr rtlCol="0" anchor="ctr" lIns="0" rIns="0"/>
+          <a:lstStyle/>
+          <a:p>
+            <a:pPr algn="ctr"/>
+            <a:r>
+              <a:rPr sz="2000">
+                <a:latin typeface="Calibri"/>
+              </a:rPr>
+              <a:t>z1: Sensorimotor</a:t>
             </a:r>
           </a:p>
         </p:txBody>

</xml_diff>